<commit_message>
updating some minor tweaks
</commit_message>
<xml_diff>
--- a/Housing Price prediction.pptx
+++ b/Housing Price prediction.pptx
@@ -5,7 +5,7 @@
     <p:sldMasterId id="2147483648" r:id="rId1"/>
   </p:sldMasterIdLst>
   <p:notesMasterIdLst>
-    <p:notesMasterId r:id="rId24"/>
+    <p:notesMasterId r:id="rId28"/>
   </p:notesMasterIdLst>
   <p:sldIdLst>
     <p:sldId id="257" r:id="rId2"/>
@@ -26,10 +26,14 @@
     <p:sldId id="270" r:id="rId17"/>
     <p:sldId id="271" r:id="rId18"/>
     <p:sldId id="272" r:id="rId19"/>
-    <p:sldId id="274" r:id="rId20"/>
-    <p:sldId id="275" r:id="rId21"/>
-    <p:sldId id="276" r:id="rId22"/>
-    <p:sldId id="279" r:id="rId23"/>
+    <p:sldId id="283" r:id="rId20"/>
+    <p:sldId id="280" r:id="rId21"/>
+    <p:sldId id="274" r:id="rId22"/>
+    <p:sldId id="281" r:id="rId23"/>
+    <p:sldId id="275" r:id="rId24"/>
+    <p:sldId id="282" r:id="rId25"/>
+    <p:sldId id="276" r:id="rId26"/>
+    <p:sldId id="279" r:id="rId27"/>
   </p:sldIdLst>
   <p:sldSz cx="12192000" cy="6858000"/>
   <p:notesSz cx="6858000" cy="9144000"/>
@@ -1632,7 +1636,7 @@
           <a:p>
             <a:fld id="{992C8AEA-FCD4-4A68-AF08-0389E2D40B59}" type="datetimeFigureOut">
               <a:rPr lang="en-US" smtClean="0"/>
-              <a:t>4/4/2023</a:t>
+              <a:t>4/5/23</a:t>
             </a:fld>
             <a:endParaRPr lang="en-US"/>
           </a:p>
@@ -3509,7 +3513,7 @@
             </a:pPr>
             <a:fld id="{00000000-1234-1234-1234-123412341234}" type="slidenum">
               <a:rPr lang="en-US"/>
-              <a:t>19</a:t>
+              <a:t>21</a:t>
             </a:fld>
             <a:endParaRPr/>
           </a:p>
@@ -3837,7 +3841,7 @@
             </a:pPr>
             <a:fld id="{00000000-1234-1234-1234-123412341234}" type="slidenum">
               <a:rPr lang="en-US"/>
-              <a:t>20</a:t>
+              <a:t>23</a:t>
             </a:fld>
             <a:endParaRPr/>
           </a:p>
@@ -3997,7 +4001,7 @@
             </a:pPr>
             <a:fld id="{00000000-1234-1234-1234-123412341234}" type="slidenum">
               <a:rPr lang="en-US"/>
-              <a:t>21</a:t>
+              <a:t>25</a:t>
             </a:fld>
             <a:endParaRPr/>
           </a:p>
@@ -4157,7 +4161,7 @@
             </a:pPr>
             <a:fld id="{00000000-1234-1234-1234-123412341234}" type="slidenum">
               <a:rPr lang="en-US"/>
-              <a:t>22</a:t>
+              <a:t>26</a:t>
             </a:fld>
             <a:endParaRPr/>
           </a:p>
@@ -5254,7 +5258,7 @@
           <a:p>
             <a:fld id="{D04A5A97-BE12-4C01-9A9F-705F05E9CC6D}" type="datetimeFigureOut">
               <a:rPr lang="en-US" smtClean="0"/>
-              <a:t>4/4/2023</a:t>
+              <a:t>4/5/23</a:t>
             </a:fld>
             <a:endParaRPr lang="en-US"/>
           </a:p>
@@ -5452,7 +5456,7 @@
           <a:p>
             <a:fld id="{D04A5A97-BE12-4C01-9A9F-705F05E9CC6D}" type="datetimeFigureOut">
               <a:rPr lang="en-US" smtClean="0"/>
-              <a:t>4/4/2023</a:t>
+              <a:t>4/5/23</a:t>
             </a:fld>
             <a:endParaRPr lang="en-US"/>
           </a:p>
@@ -5660,7 +5664,7 @@
           <a:p>
             <a:fld id="{D04A5A97-BE12-4C01-9A9F-705F05E9CC6D}" type="datetimeFigureOut">
               <a:rPr lang="en-US" smtClean="0"/>
-              <a:t>4/4/2023</a:t>
+              <a:t>4/5/23</a:t>
             </a:fld>
             <a:endParaRPr lang="en-US"/>
           </a:p>
@@ -6520,7 +6524,7 @@
           <a:p>
             <a:fld id="{D04A5A97-BE12-4C01-9A9F-705F05E9CC6D}" type="datetimeFigureOut">
               <a:rPr lang="en-US" smtClean="0"/>
-              <a:t>4/4/2023</a:t>
+              <a:t>4/5/23</a:t>
             </a:fld>
             <a:endParaRPr lang="en-US"/>
           </a:p>
@@ -6795,7 +6799,7 @@
           <a:p>
             <a:fld id="{D04A5A97-BE12-4C01-9A9F-705F05E9CC6D}" type="datetimeFigureOut">
               <a:rPr lang="en-US" smtClean="0"/>
-              <a:t>4/4/2023</a:t>
+              <a:t>4/5/23</a:t>
             </a:fld>
             <a:endParaRPr lang="en-US"/>
           </a:p>
@@ -7060,7 +7064,7 @@
           <a:p>
             <a:fld id="{D04A5A97-BE12-4C01-9A9F-705F05E9CC6D}" type="datetimeFigureOut">
               <a:rPr lang="en-US" smtClean="0"/>
-              <a:t>4/4/2023</a:t>
+              <a:t>4/5/23</a:t>
             </a:fld>
             <a:endParaRPr lang="en-US"/>
           </a:p>
@@ -7472,7 +7476,7 @@
           <a:p>
             <a:fld id="{D04A5A97-BE12-4C01-9A9F-705F05E9CC6D}" type="datetimeFigureOut">
               <a:rPr lang="en-US" smtClean="0"/>
-              <a:t>4/4/2023</a:t>
+              <a:t>4/5/23</a:t>
             </a:fld>
             <a:endParaRPr lang="en-US"/>
           </a:p>
@@ -7613,7 +7617,7 @@
           <a:p>
             <a:fld id="{D04A5A97-BE12-4C01-9A9F-705F05E9CC6D}" type="datetimeFigureOut">
               <a:rPr lang="en-US" smtClean="0"/>
-              <a:t>4/4/2023</a:t>
+              <a:t>4/5/23</a:t>
             </a:fld>
             <a:endParaRPr lang="en-US"/>
           </a:p>
@@ -7726,7 +7730,7 @@
           <a:p>
             <a:fld id="{D04A5A97-BE12-4C01-9A9F-705F05E9CC6D}" type="datetimeFigureOut">
               <a:rPr lang="en-US" smtClean="0"/>
-              <a:t>4/4/2023</a:t>
+              <a:t>4/5/23</a:t>
             </a:fld>
             <a:endParaRPr lang="en-US"/>
           </a:p>
@@ -8037,7 +8041,7 @@
           <a:p>
             <a:fld id="{D04A5A97-BE12-4C01-9A9F-705F05E9CC6D}" type="datetimeFigureOut">
               <a:rPr lang="en-US" smtClean="0"/>
-              <a:t>4/4/2023</a:t>
+              <a:t>4/5/23</a:t>
             </a:fld>
             <a:endParaRPr lang="en-US"/>
           </a:p>
@@ -8325,7 +8329,7 @@
           <a:p>
             <a:fld id="{D04A5A97-BE12-4C01-9A9F-705F05E9CC6D}" type="datetimeFigureOut">
               <a:rPr lang="en-US" smtClean="0"/>
-              <a:t>4/4/2023</a:t>
+              <a:t>4/5/23</a:t>
             </a:fld>
             <a:endParaRPr lang="en-US"/>
           </a:p>
@@ -8566,7 +8570,7 @@
           <a:p>
             <a:fld id="{D04A5A97-BE12-4C01-9A9F-705F05E9CC6D}" type="datetimeFigureOut">
               <a:rPr lang="en-US" smtClean="0"/>
-              <a:t>4/4/2023</a:t>
+              <a:t>4/5/23</a:t>
             </a:fld>
             <a:endParaRPr lang="en-US"/>
           </a:p>
@@ -14084,7 +14088,7 @@
   <p:cSld>
     <p:spTree>
       <p:nvGrpSpPr>
-        <p:cNvPr id="1" name="Shape 271"/>
+        <p:cNvPr id="1" name=""/>
         <p:cNvGrpSpPr/>
         <p:nvPr/>
       </p:nvGrpSpPr>
@@ -14098,8 +14102,14 @@
       </p:grpSpPr>
       <p:sp>
         <p:nvSpPr>
-          <p:cNvPr id="272" name="Google Shape;272;ga479f66027_0_1"/>
-          <p:cNvSpPr txBox="1">
+          <p:cNvPr id="2" name="Title 1">
+            <a:extLst>
+              <a:ext uri="{FF2B5EF4-FFF2-40B4-BE49-F238E27FC236}">
+                <a16:creationId xmlns:a16="http://schemas.microsoft.com/office/drawing/2014/main" id="{E4899EFE-7284-94B3-06E5-1A4B3464CC77}"/>
+              </a:ext>
+            </a:extLst>
+          </p:cNvPr>
+          <p:cNvSpPr>
             <a:spLocks noGrp="1"/>
           </p:cNvSpPr>
           <p:nvPr>
@@ -14108,259 +14118,62 @@
         </p:nvSpPr>
         <p:spPr>
           <a:xfrm>
-            <a:off x="1035171" y="821125"/>
-            <a:ext cx="10921040" cy="738296"/>
-          </a:xfrm>
-          <a:prstGeom prst="rect">
-            <a:avLst/>
-          </a:prstGeom>
+            <a:off x="1738400" y="402684"/>
+            <a:ext cx="9374000" cy="1332400"/>
+          </a:xfrm>
         </p:spPr>
         <p:txBody>
-          <a:bodyPr spcFirstLastPara="1" wrap="square" lIns="91425" tIns="91425" rIns="91425" bIns="91425" anchor="t" anchorCtr="0">
-            <a:noAutofit/>
-          </a:bodyPr>
+          <a:bodyPr/>
           <a:lstStyle/>
           <a:p>
-            <a:pPr marL="0" lvl="0" indent="0" algn="l" rtl="0">
-              <a:spcBef>
-                <a:spcPts val="0"/>
-              </a:spcBef>
-              <a:spcAft>
-                <a:spcPts val="0"/>
-              </a:spcAft>
-              <a:buNone/>
-            </a:pPr>
             <a:r>
               <a:rPr lang="en-US" dirty="0"/>
-              <a:t>DATA ANALYSIS (PROPHET MODEL PREDICTION)</a:t>
+              <a:t>Prophet Prediction model</a:t>
             </a:r>
           </a:p>
         </p:txBody>
       </p:sp>
       <p:sp>
         <p:nvSpPr>
-          <p:cNvPr id="275" name="Google Shape;275;ga479f66027_0_1"/>
-          <p:cNvSpPr txBox="1"/>
-          <p:nvPr/>
-        </p:nvSpPr>
-        <p:spPr>
-          <a:xfrm>
-            <a:off x="7210682" y="1998042"/>
-            <a:ext cx="1843954" cy="1967951"/>
-          </a:xfrm>
-          <a:prstGeom prst="rect">
-            <a:avLst/>
-          </a:prstGeom>
-          <a:noFill/>
-          <a:ln>
-            <a:noFill/>
-          </a:ln>
-        </p:spPr>
-        <p:txBody>
-          <a:bodyPr spcFirstLastPara="1" wrap="square" lIns="121900" tIns="121900" rIns="121900" bIns="121900" anchor="t" anchorCtr="0">
-            <a:noAutofit/>
-          </a:bodyPr>
-          <a:lstStyle/>
-          <a:p>
-            <a:pPr marL="0" lvl="0" indent="0" algn="ctr" rtl="0">
-              <a:lnSpc>
-                <a:spcPct val="115000"/>
-              </a:lnSpc>
-              <a:spcBef>
-                <a:spcPts val="0"/>
-              </a:spcBef>
-              <a:spcAft>
-                <a:spcPts val="0"/>
-              </a:spcAft>
-              <a:buNone/>
-            </a:pPr>
-            <a:r>
-              <a:rPr lang="en-US" sz="1500" b="1" dirty="0">
-                <a:solidFill>
-                  <a:srgbClr val="FFFFFF"/>
-                </a:solidFill>
-                <a:latin typeface="Roboto"/>
-                <a:ea typeface="Roboto"/>
-                <a:cs typeface="Roboto"/>
-                <a:sym typeface="Roboto"/>
-              </a:rPr>
-              <a:t>Vestibulum </a:t>
-            </a:r>
-            <a:endParaRPr sz="1100" dirty="0">
-              <a:solidFill>
-                <a:srgbClr val="FFFFFF"/>
-              </a:solidFill>
-            </a:endParaRPr>
-          </a:p>
-        </p:txBody>
-      </p:sp>
-      <p:sp>
-        <p:nvSpPr>
-          <p:cNvPr id="277" name="Google Shape;277;ga479f66027_0_1"/>
-          <p:cNvSpPr txBox="1"/>
-          <p:nvPr/>
-        </p:nvSpPr>
-        <p:spPr>
-          <a:xfrm>
-            <a:off x="720400" y="1759789"/>
-            <a:ext cx="3552464" cy="4277086"/>
-          </a:xfrm>
-          <a:prstGeom prst="rect">
-            <a:avLst/>
-          </a:prstGeom>
-          <a:noFill/>
-          <a:ln>
-            <a:noFill/>
-          </a:ln>
-        </p:spPr>
-        <p:txBody>
-          <a:bodyPr spcFirstLastPara="1" wrap="square" lIns="91425" tIns="91425" rIns="91425" bIns="91425" anchor="t" anchorCtr="0">
-            <a:noAutofit/>
-          </a:bodyPr>
-          <a:lstStyle/>
-          <a:p>
-            <a:pPr marL="0" lvl="0" indent="0" algn="l" rtl="0">
-              <a:spcBef>
-                <a:spcPts val="0"/>
-              </a:spcBef>
-              <a:spcAft>
-                <a:spcPts val="0"/>
-              </a:spcAft>
-              <a:buNone/>
-            </a:pPr>
-            <a:endParaRPr lang="en-US" sz="1500" dirty="0">
-              <a:latin typeface="Twentieth Century"/>
-              <a:ea typeface="Twentieth Century"/>
-              <a:cs typeface="Twentieth Century"/>
-              <a:sym typeface="Twentieth Century"/>
-            </a:endParaRPr>
-          </a:p>
-        </p:txBody>
-      </p:sp>
-      <p:sp>
-        <p:nvSpPr>
-          <p:cNvPr id="278" name="Google Shape;278;ga479f66027_0_1"/>
-          <p:cNvSpPr txBox="1"/>
-          <p:nvPr/>
-        </p:nvSpPr>
-        <p:spPr>
-          <a:xfrm>
-            <a:off x="5401075" y="2353793"/>
-            <a:ext cx="1948200" cy="906000"/>
-          </a:xfrm>
-          <a:prstGeom prst="rect">
-            <a:avLst/>
-          </a:prstGeom>
-          <a:noFill/>
-          <a:ln>
-            <a:noFill/>
-          </a:ln>
-        </p:spPr>
-        <p:txBody>
-          <a:bodyPr spcFirstLastPara="1" wrap="square" lIns="91425" tIns="91425" rIns="91425" bIns="91425" anchor="t" anchorCtr="0">
-            <a:noAutofit/>
-          </a:bodyPr>
-          <a:lstStyle/>
-          <a:p>
-            <a:pPr marL="0" lvl="0" indent="0" algn="l" rtl="0">
-              <a:lnSpc>
-                <a:spcPct val="115000"/>
-              </a:lnSpc>
-              <a:spcBef>
-                <a:spcPts val="0"/>
-              </a:spcBef>
-              <a:spcAft>
-                <a:spcPts val="0"/>
-              </a:spcAft>
-              <a:buNone/>
-            </a:pPr>
-            <a:endParaRPr sz="1500" dirty="0">
-              <a:latin typeface="Twentieth Century"/>
-              <a:ea typeface="Twentieth Century"/>
-              <a:cs typeface="Twentieth Century"/>
-              <a:sym typeface="Twentieth Century"/>
-            </a:endParaRPr>
-          </a:p>
-          <a:p>
-            <a:pPr marL="0" lvl="0" indent="0" algn="l" rtl="0">
-              <a:spcBef>
-                <a:spcPts val="0"/>
-              </a:spcBef>
-              <a:spcAft>
-                <a:spcPts val="0"/>
-              </a:spcAft>
-              <a:buNone/>
-            </a:pPr>
-            <a:endParaRPr sz="1500" dirty="0">
-              <a:latin typeface="Twentieth Century"/>
-              <a:ea typeface="Twentieth Century"/>
-              <a:cs typeface="Twentieth Century"/>
-              <a:sym typeface="Twentieth Century"/>
-            </a:endParaRPr>
-          </a:p>
-        </p:txBody>
-      </p:sp>
-      <p:pic>
-        <p:nvPicPr>
-          <p:cNvPr id="4" name="Picture 3">
+          <p:cNvPr id="3" name="Text Placeholder 2">
             <a:extLst>
               <a:ext uri="{FF2B5EF4-FFF2-40B4-BE49-F238E27FC236}">
-                <a16:creationId xmlns:a16="http://schemas.microsoft.com/office/drawing/2014/main" id="{50C9E1C0-5154-3CD9-D95D-5727D08B9204}"/>
+                <a16:creationId xmlns:a16="http://schemas.microsoft.com/office/drawing/2014/main" id="{480E1779-BD97-EB20-D4E8-4594E16BAE93}"/>
               </a:ext>
             </a:extLst>
           </p:cNvPr>
-          <p:cNvPicPr>
-            <a:picLocks noChangeAspect="1"/>
-          </p:cNvPicPr>
-          <p:nvPr/>
-        </p:nvPicPr>
-        <p:blipFill>
-          <a:blip r:embed="rId3"/>
-          <a:stretch>
-            <a:fillRect/>
-          </a:stretch>
-        </p:blipFill>
+          <p:cNvSpPr>
+            <a:spLocks noGrp="1"/>
+          </p:cNvSpPr>
+          <p:nvPr>
+            <p:ph type="body" idx="1"/>
+          </p:nvPr>
+        </p:nvSpPr>
         <p:spPr>
           <a:xfrm>
-            <a:off x="1103762" y="2536895"/>
-            <a:ext cx="5646332" cy="3853080"/>
-          </a:xfrm>
-          <a:prstGeom prst="rect">
-            <a:avLst/>
-          </a:prstGeom>
-        </p:spPr>
-      </p:pic>
-      <p:sp>
-        <p:nvSpPr>
-          <p:cNvPr id="5" name="TextBox 4">
-            <a:extLst>
-              <a:ext uri="{FF2B5EF4-FFF2-40B4-BE49-F238E27FC236}">
-                <a16:creationId xmlns:a16="http://schemas.microsoft.com/office/drawing/2014/main" id="{27FDF9AA-DC09-C98F-4825-0E2769AC85F7}"/>
-              </a:ext>
-            </a:extLst>
-          </p:cNvPr>
-          <p:cNvSpPr txBox="1"/>
-          <p:nvPr/>
-        </p:nvSpPr>
-        <p:spPr>
-          <a:xfrm>
-            <a:off x="1259456" y="1759789"/>
-            <a:ext cx="6219645" cy="369332"/>
-          </a:xfrm>
-          <a:prstGeom prst="rect">
-            <a:avLst/>
-          </a:prstGeom>
-          <a:noFill/>
+            <a:off x="416226" y="1417724"/>
+            <a:ext cx="11508044" cy="3388800"/>
+          </a:xfrm>
         </p:spPr>
         <p:txBody>
-          <a:bodyPr wrap="square" rtlCol="0">
-            <a:spAutoFit/>
-          </a:bodyPr>
+          <a:bodyPr/>
           <a:lstStyle/>
           <a:p>
             <a:r>
               <a:rPr lang="en-US" dirty="0"/>
-              <a:t>County: Santa Clara, City: San Jose, Neighborhood: Evergreen</a:t>
+              <a:t>Two models were created:</a:t>
+            </a:r>
+          </a:p>
+          <a:p>
+            <a:r>
+              <a:rPr lang="en-US" dirty="0"/>
+              <a:t>One showed the aggregated city-wide data to predict the estimated home value in the coming 5 years for homeowners/investors knowledge</a:t>
+            </a:r>
+          </a:p>
+          <a:p>
+            <a:r>
+              <a:rPr lang="en-US" dirty="0"/>
+              <a:t>The other shows what the estimated values are for a 6-month window to show how the market may change within the coming months</a:t>
             </a:r>
           </a:p>
         </p:txBody>
@@ -14368,7 +14181,7 @@
     </p:spTree>
     <p:extLst>
       <p:ext uri="{BB962C8B-B14F-4D97-AF65-F5344CB8AC3E}">
-        <p14:creationId xmlns:p14="http://schemas.microsoft.com/office/powerpoint/2010/main" val="2736716904"/>
+        <p14:creationId xmlns:p14="http://schemas.microsoft.com/office/powerpoint/2010/main" val="3723176282"/>
       </p:ext>
     </p:extLst>
   </p:cSld>
@@ -15778,7 +15591,7 @@
   <p:cSld>
     <p:spTree>
       <p:nvGrpSpPr>
-        <p:cNvPr id="1" name="Shape 271"/>
+        <p:cNvPr id="1" name=""/>
         <p:cNvGrpSpPr/>
         <p:nvPr/>
       </p:nvGrpSpPr>
@@ -15792,55 +15605,141 @@
       </p:grpSpPr>
       <p:sp>
         <p:nvSpPr>
-          <p:cNvPr id="272" name="Google Shape;272;ga479f66027_0_1"/>
-          <p:cNvSpPr txBox="1">
+          <p:cNvPr id="3" name="Text Placeholder 2">
+            <a:extLst>
+              <a:ext uri="{FF2B5EF4-FFF2-40B4-BE49-F238E27FC236}">
+                <a16:creationId xmlns:a16="http://schemas.microsoft.com/office/drawing/2014/main" id="{31CABD0D-0A12-AD34-D290-714220180715}"/>
+              </a:ext>
+            </a:extLst>
+          </p:cNvPr>
+          <p:cNvSpPr>
             <a:spLocks noGrp="1"/>
           </p:cNvSpPr>
           <p:nvPr>
-            <p:ph type="title"/>
+            <p:ph type="body" idx="1"/>
           </p:nvPr>
         </p:nvSpPr>
-        <p:spPr>
+        <p:spPr/>
+        <p:txBody>
+          <a:bodyPr/>
+          <a:lstStyle/>
+          <a:p>
+            <a:endParaRPr lang="en-US" dirty="0"/>
+          </a:p>
+        </p:txBody>
+      </p:sp>
+      <p:pic>
+        <p:nvPicPr>
+          <p:cNvPr id="3074" name="Picture 2">
+            <a:extLst>
+              <a:ext uri="{FF2B5EF4-FFF2-40B4-BE49-F238E27FC236}">
+                <a16:creationId xmlns:a16="http://schemas.microsoft.com/office/drawing/2014/main" id="{F52121B4-EC62-3E0E-6BAD-A36690485FFA}"/>
+              </a:ext>
+            </a:extLst>
+          </p:cNvPr>
+          <p:cNvPicPr>
+            <a:picLocks noChangeAspect="1" noChangeArrowheads="1"/>
+          </p:cNvPicPr>
+          <p:nvPr/>
+        </p:nvPicPr>
+        <p:blipFill>
+          <a:blip r:embed="rId2">
+            <a:extLst>
+              <a:ext uri="{28A0092B-C50C-407E-A947-70E740481C1C}">
+                <a14:useLocalDpi xmlns:a14="http://schemas.microsoft.com/office/drawing/2010/main" val="0"/>
+              </a:ext>
+            </a:extLst>
+          </a:blip>
+          <a:srcRect/>
+          <a:stretch>
+            <a:fillRect/>
+          </a:stretch>
+        </p:blipFill>
+        <p:spPr bwMode="auto">
           <a:xfrm>
-            <a:off x="1035171" y="821125"/>
-            <a:ext cx="10921040" cy="738296"/>
+            <a:off x="257029" y="1255210"/>
+            <a:ext cx="8503912" cy="5078560"/>
           </a:xfrm>
           <a:prstGeom prst="rect">
             <a:avLst/>
           </a:prstGeom>
-        </p:spPr>
-        <p:txBody>
-          <a:bodyPr spcFirstLastPara="1" wrap="square" lIns="91425" tIns="91425" rIns="91425" bIns="91425" anchor="t" anchorCtr="0">
-            <a:noAutofit/>
-          </a:bodyPr>
-          <a:lstStyle/>
-          <a:p>
-            <a:pPr marL="0" lvl="0" indent="0" algn="l" rtl="0">
-              <a:spcBef>
-                <a:spcPts val="0"/>
-              </a:spcBef>
-              <a:spcAft>
-                <a:spcPts val="0"/>
-              </a:spcAft>
-              <a:buNone/>
-            </a:pPr>
-            <a:r>
-              <a:rPr lang="en-US" dirty="0"/>
-              <a:t>DATA ANALYSIS (PROPHET MODEL PREDICTION)</a:t>
-            </a:r>
-          </a:p>
-        </p:txBody>
-      </p:sp>
-      <p:sp>
-        <p:nvSpPr>
-          <p:cNvPr id="275" name="Google Shape;275;ga479f66027_0_1"/>
-          <p:cNvSpPr txBox="1"/>
+          <a:noFill/>
+          <a:extLst>
+            <a:ext uri="{909E8E84-426E-40DD-AFC4-6F175D3DCCD1}">
+              <a14:hiddenFill xmlns:a14="http://schemas.microsoft.com/office/drawing/2010/main">
+                <a:solidFill>
+                  <a:srgbClr val="FFFFFF"/>
+                </a:solidFill>
+              </a14:hiddenFill>
+            </a:ext>
+          </a:extLst>
+        </p:spPr>
+      </p:pic>
+      <p:pic>
+        <p:nvPicPr>
+          <p:cNvPr id="3076" name="Picture 4">
+            <a:extLst>
+              <a:ext uri="{FF2B5EF4-FFF2-40B4-BE49-F238E27FC236}">
+                <a16:creationId xmlns:a16="http://schemas.microsoft.com/office/drawing/2014/main" id="{00B70BA3-C861-F5DA-6050-A66A49CC385B}"/>
+              </a:ext>
+            </a:extLst>
+          </p:cNvPr>
+          <p:cNvPicPr>
+            <a:picLocks noChangeAspect="1" noChangeArrowheads="1"/>
+          </p:cNvPicPr>
+          <p:nvPr/>
+        </p:nvPicPr>
+        <p:blipFill>
+          <a:blip r:embed="rId3">
+            <a:extLst>
+              <a:ext uri="{28A0092B-C50C-407E-A947-70E740481C1C}">
+                <a14:useLocalDpi xmlns:a14="http://schemas.microsoft.com/office/drawing/2010/main" val="0"/>
+              </a:ext>
+            </a:extLst>
+          </a:blip>
+          <a:srcRect/>
+          <a:stretch>
+            <a:fillRect/>
+          </a:stretch>
+        </p:blipFill>
+        <p:spPr bwMode="auto">
+          <a:xfrm>
+            <a:off x="6096000" y="3121232"/>
+            <a:ext cx="6030870" cy="3212538"/>
+          </a:xfrm>
+          <a:prstGeom prst="rect">
+            <a:avLst/>
+          </a:prstGeom>
+          <a:noFill/>
+          <a:extLst>
+            <a:ext uri="{909E8E84-426E-40DD-AFC4-6F175D3DCCD1}">
+              <a14:hiddenFill xmlns:a14="http://schemas.microsoft.com/office/drawing/2010/main">
+                <a:solidFill>
+                  <a:srgbClr val="FFFFFF"/>
+                </a:solidFill>
+              </a14:hiddenFill>
+            </a:ext>
+          </a:extLst>
+        </p:spPr>
+      </p:pic>
+      <p:sp>
+        <p:nvSpPr>
+          <p:cNvPr id="4" name="Google Shape;272;ga479f66027_0_1">
+            <a:extLst>
+              <a:ext uri="{FF2B5EF4-FFF2-40B4-BE49-F238E27FC236}">
+                <a16:creationId xmlns:a16="http://schemas.microsoft.com/office/drawing/2014/main" id="{04DAF633-4877-E247-A8FB-0D504A9284D7}"/>
+              </a:ext>
+            </a:extLst>
+          </p:cNvPr>
+          <p:cNvSpPr txBox="1">
+            <a:spLocks/>
+          </p:cNvSpPr>
           <p:nvPr/>
         </p:nvSpPr>
         <p:spPr>
           <a:xfrm>
-            <a:off x="7210682" y="1998042"/>
-            <a:ext cx="1843954" cy="1967951"/>
+            <a:off x="635480" y="399817"/>
+            <a:ext cx="10921040" cy="738296"/>
           </a:xfrm>
           <a:prstGeom prst="rect">
             <a:avLst/>
@@ -15851,14 +15750,13 @@
           </a:ln>
         </p:spPr>
         <p:txBody>
-          <a:bodyPr spcFirstLastPara="1" wrap="square" lIns="121900" tIns="121900" rIns="121900" bIns="121900" anchor="t" anchorCtr="0">
+          <a:bodyPr spcFirstLastPara="1" vert="horz" wrap="square" lIns="91425" tIns="91425" rIns="91425" bIns="91425" rtlCol="0" anchor="t" anchorCtr="0">
             <a:noAutofit/>
           </a:bodyPr>
-          <a:lstStyle/>
-          <a:p>
-            <a:pPr marL="0" lvl="0" indent="0" algn="ctr" rtl="0">
+          <a:lstStyle>
+            <a:lvl1pPr lvl="0" algn="l" defTabSz="914400" rtl="0" eaLnBrk="1" latinLnBrk="0" hangingPunct="1">
               <a:lnSpc>
-                <a:spcPct val="115000"/>
+                <a:spcPct val="100000"/>
               </a:lnSpc>
               <a:spcBef>
                 <a:spcPts val="0"/>
@@ -15866,99 +15764,38 @@
               <a:spcAft>
                 <a:spcPts val="0"/>
               </a:spcAft>
-              <a:buNone/>
-            </a:pPr>
-            <a:r>
-              <a:rPr lang="en-US" sz="1500" b="1" dirty="0">
+              <a:buClr>
+                <a:schemeClr val="dk1"/>
+              </a:buClr>
+              <a:buSzPts val="2800"/>
+              <a:buFont typeface="Twentieth Century"/>
+              <a:buNone/>
+              <a:defRPr sz="4400" kern="1200">
                 <a:solidFill>
-                  <a:srgbClr val="FFFFFF"/>
+                  <a:schemeClr val="tx1"/>
                 </a:solidFill>
-                <a:latin typeface="Roboto"/>
-                <a:ea typeface="Roboto"/>
-                <a:cs typeface="Roboto"/>
-                <a:sym typeface="Roboto"/>
-              </a:rPr>
-              <a:t>Vestibulum </a:t>
-            </a:r>
-            <a:endParaRPr sz="1100" dirty="0">
-              <a:solidFill>
-                <a:srgbClr val="FFFFFF"/>
-              </a:solidFill>
-            </a:endParaRPr>
-          </a:p>
-        </p:txBody>
-      </p:sp>
-      <p:sp>
-        <p:nvSpPr>
-          <p:cNvPr id="277" name="Google Shape;277;ga479f66027_0_1"/>
-          <p:cNvSpPr txBox="1"/>
-          <p:nvPr/>
-        </p:nvSpPr>
-        <p:spPr>
-          <a:xfrm>
-            <a:off x="720400" y="1759789"/>
-            <a:ext cx="3552464" cy="4277086"/>
-          </a:xfrm>
-          <a:prstGeom prst="rect">
-            <a:avLst/>
-          </a:prstGeom>
-          <a:noFill/>
-          <a:ln>
-            <a:noFill/>
-          </a:ln>
-        </p:spPr>
-        <p:txBody>
-          <a:bodyPr spcFirstLastPara="1" wrap="square" lIns="91425" tIns="91425" rIns="91425" bIns="91425" anchor="t" anchorCtr="0">
-            <a:noAutofit/>
-          </a:bodyPr>
-          <a:lstStyle/>
-          <a:p>
-            <a:pPr marL="0" lvl="0" indent="0" algn="l" rtl="0">
+                <a:latin typeface="+mj-lt"/>
+                <a:ea typeface="+mj-ea"/>
+                <a:cs typeface="+mj-cs"/>
+              </a:defRPr>
+            </a:lvl1pPr>
+            <a:lvl2pPr lvl="1" algn="l">
+              <a:lnSpc>
+                <a:spcPct val="100000"/>
+              </a:lnSpc>
               <a:spcBef>
                 <a:spcPts val="0"/>
               </a:spcBef>
               <a:spcAft>
                 <a:spcPts val="0"/>
               </a:spcAft>
-              <a:buNone/>
-            </a:pPr>
-            <a:endParaRPr lang="en-US" sz="1500" dirty="0">
-              <a:latin typeface="Twentieth Century"/>
-              <a:ea typeface="Twentieth Century"/>
-              <a:cs typeface="Twentieth Century"/>
-              <a:sym typeface="Twentieth Century"/>
-            </a:endParaRPr>
-          </a:p>
-        </p:txBody>
-      </p:sp>
-      <p:sp>
-        <p:nvSpPr>
-          <p:cNvPr id="278" name="Google Shape;278;ga479f66027_0_1"/>
-          <p:cNvSpPr txBox="1"/>
-          <p:nvPr/>
-        </p:nvSpPr>
-        <p:spPr>
-          <a:xfrm>
-            <a:off x="5401075" y="2353793"/>
-            <a:ext cx="1948200" cy="906000"/>
-          </a:xfrm>
-          <a:prstGeom prst="rect">
-            <a:avLst/>
-          </a:prstGeom>
-          <a:noFill/>
-          <a:ln>
-            <a:noFill/>
-          </a:ln>
-        </p:spPr>
-        <p:txBody>
-          <a:bodyPr spcFirstLastPara="1" wrap="square" lIns="91425" tIns="91425" rIns="91425" bIns="91425" anchor="t" anchorCtr="0">
-            <a:noAutofit/>
-          </a:bodyPr>
-          <a:lstStyle/>
-          <a:p>
-            <a:pPr marL="0" lvl="0" indent="0" algn="l" rtl="0">
+              <a:buSzPts val="2800"/>
+              <a:buNone/>
+              <a:defRPr/>
+            </a:lvl2pPr>
+            <a:lvl3pPr lvl="2" algn="l">
               <a:lnSpc>
-                <a:spcPct val="115000"/>
+                <a:spcPct val="100000"/>
               </a:lnSpc>
               <a:spcBef>
                 <a:spcPts val="0"/>
@@ -15966,103 +15803,108 @@
               <a:spcAft>
                 <a:spcPts val="0"/>
               </a:spcAft>
-              <a:buNone/>
-            </a:pPr>
-            <a:endParaRPr sz="1500" dirty="0">
-              <a:latin typeface="Twentieth Century"/>
-              <a:ea typeface="Twentieth Century"/>
-              <a:cs typeface="Twentieth Century"/>
-              <a:sym typeface="Twentieth Century"/>
-            </a:endParaRPr>
-          </a:p>
-          <a:p>
-            <a:pPr marL="0" lvl="0" indent="0" algn="l" rtl="0">
+              <a:buSzPts val="2800"/>
+              <a:buNone/>
+              <a:defRPr/>
+            </a:lvl3pPr>
+            <a:lvl4pPr lvl="3" algn="l">
+              <a:lnSpc>
+                <a:spcPct val="100000"/>
+              </a:lnSpc>
               <a:spcBef>
                 <a:spcPts val="0"/>
               </a:spcBef>
               <a:spcAft>
                 <a:spcPts val="0"/>
               </a:spcAft>
-              <a:buNone/>
-            </a:pPr>
-            <a:endParaRPr sz="1500" dirty="0">
-              <a:latin typeface="Twentieth Century"/>
-              <a:ea typeface="Twentieth Century"/>
-              <a:cs typeface="Twentieth Century"/>
-              <a:sym typeface="Twentieth Century"/>
-            </a:endParaRPr>
+              <a:buSzPts val="2800"/>
+              <a:buNone/>
+              <a:defRPr/>
+            </a:lvl4pPr>
+            <a:lvl5pPr lvl="4" algn="l">
+              <a:lnSpc>
+                <a:spcPct val="100000"/>
+              </a:lnSpc>
+              <a:spcBef>
+                <a:spcPts val="0"/>
+              </a:spcBef>
+              <a:spcAft>
+                <a:spcPts val="0"/>
+              </a:spcAft>
+              <a:buSzPts val="2800"/>
+              <a:buNone/>
+              <a:defRPr/>
+            </a:lvl5pPr>
+            <a:lvl6pPr lvl="5" algn="l">
+              <a:lnSpc>
+                <a:spcPct val="100000"/>
+              </a:lnSpc>
+              <a:spcBef>
+                <a:spcPts val="0"/>
+              </a:spcBef>
+              <a:spcAft>
+                <a:spcPts val="0"/>
+              </a:spcAft>
+              <a:buSzPts val="2800"/>
+              <a:buNone/>
+              <a:defRPr/>
+            </a:lvl6pPr>
+            <a:lvl7pPr lvl="6" algn="l">
+              <a:lnSpc>
+                <a:spcPct val="100000"/>
+              </a:lnSpc>
+              <a:spcBef>
+                <a:spcPts val="0"/>
+              </a:spcBef>
+              <a:spcAft>
+                <a:spcPts val="0"/>
+              </a:spcAft>
+              <a:buSzPts val="2800"/>
+              <a:buNone/>
+              <a:defRPr/>
+            </a:lvl7pPr>
+            <a:lvl8pPr lvl="7" algn="l">
+              <a:lnSpc>
+                <a:spcPct val="100000"/>
+              </a:lnSpc>
+              <a:spcBef>
+                <a:spcPts val="0"/>
+              </a:spcBef>
+              <a:spcAft>
+                <a:spcPts val="0"/>
+              </a:spcAft>
+              <a:buSzPts val="2800"/>
+              <a:buNone/>
+              <a:defRPr/>
+            </a:lvl8pPr>
+            <a:lvl9pPr lvl="8" algn="l">
+              <a:lnSpc>
+                <a:spcPct val="100000"/>
+              </a:lnSpc>
+              <a:spcBef>
+                <a:spcPts val="0"/>
+              </a:spcBef>
+              <a:spcAft>
+                <a:spcPts val="0"/>
+              </a:spcAft>
+              <a:buSzPts val="2800"/>
+              <a:buNone/>
+              <a:defRPr/>
+            </a:lvl9pPr>
+          </a:lstStyle>
+          <a:p>
+            <a:r>
+              <a:rPr lang="en-US" sz="3200"/>
+              <a:t>The Data Analyst moving to Silicon Valley for a hot new start-up</a:t>
+            </a:r>
+            <a:endParaRPr lang="en-US" sz="3200" dirty="0"/>
           </a:p>
         </p:txBody>
       </p:sp>
-      <p:sp>
-        <p:nvSpPr>
-          <p:cNvPr id="5" name="TextBox 4">
-            <a:extLst>
-              <a:ext uri="{FF2B5EF4-FFF2-40B4-BE49-F238E27FC236}">
-                <a16:creationId xmlns:a16="http://schemas.microsoft.com/office/drawing/2014/main" id="{27FDF9AA-DC09-C98F-4825-0E2769AC85F7}"/>
-              </a:ext>
-            </a:extLst>
-          </p:cNvPr>
-          <p:cNvSpPr txBox="1"/>
-          <p:nvPr/>
-        </p:nvSpPr>
-        <p:spPr>
-          <a:xfrm>
-            <a:off x="1259456" y="1759789"/>
-            <a:ext cx="6219645" cy="369332"/>
-          </a:xfrm>
-          <a:prstGeom prst="rect">
-            <a:avLst/>
-          </a:prstGeom>
-          <a:noFill/>
-        </p:spPr>
-        <p:txBody>
-          <a:bodyPr wrap="square" rtlCol="0">
-            <a:spAutoFit/>
-          </a:bodyPr>
-          <a:lstStyle/>
-          <a:p>
-            <a:r>
-              <a:rPr lang="en-US" dirty="0"/>
-              <a:t>County: San Diego, City: San Diego, Neighborhood: Pacific Beach</a:t>
-            </a:r>
-          </a:p>
-        </p:txBody>
-      </p:sp>
-      <p:pic>
-        <p:nvPicPr>
-          <p:cNvPr id="3" name="Picture 2">
-            <a:extLst>
-              <a:ext uri="{FF2B5EF4-FFF2-40B4-BE49-F238E27FC236}">
-                <a16:creationId xmlns:a16="http://schemas.microsoft.com/office/drawing/2014/main" id="{3412F587-3B56-0D09-DAEA-FF6729FE3F6C}"/>
-              </a:ext>
-            </a:extLst>
-          </p:cNvPr>
-          <p:cNvPicPr>
-            <a:picLocks noChangeAspect="1"/>
-          </p:cNvPicPr>
-          <p:nvPr/>
-        </p:nvPicPr>
-        <p:blipFill>
-          <a:blip r:embed="rId3"/>
-          <a:stretch>
-            <a:fillRect/>
-          </a:stretch>
-        </p:blipFill>
-        <p:spPr>
-          <a:xfrm>
-            <a:off x="1259456" y="2625577"/>
-            <a:ext cx="7026249" cy="4206605"/>
-          </a:xfrm>
-          <a:prstGeom prst="rect">
-            <a:avLst/>
-          </a:prstGeom>
-        </p:spPr>
-      </p:pic>
     </p:spTree>
     <p:extLst>
       <p:ext uri="{BB962C8B-B14F-4D97-AF65-F5344CB8AC3E}">
-        <p14:creationId xmlns:p14="http://schemas.microsoft.com/office/powerpoint/2010/main" val="2753893554"/>
+        <p14:creationId xmlns:p14="http://schemas.microsoft.com/office/powerpoint/2010/main" val="2966477912"/>
       </p:ext>
     </p:extLst>
   </p:cSld>
@@ -16101,6 +15943,2322 @@
         </p:nvSpPr>
         <p:spPr>
           <a:xfrm>
+            <a:off x="635480" y="399817"/>
+            <a:ext cx="10921040" cy="738296"/>
+          </a:xfrm>
+          <a:prstGeom prst="rect">
+            <a:avLst/>
+          </a:prstGeom>
+        </p:spPr>
+        <p:txBody>
+          <a:bodyPr spcFirstLastPara="1" wrap="square" lIns="91425" tIns="91425" rIns="91425" bIns="91425" anchor="t" anchorCtr="0">
+            <a:noAutofit/>
+          </a:bodyPr>
+          <a:lstStyle/>
+          <a:p>
+            <a:pPr marL="0" lvl="0" indent="0" algn="l" rtl="0">
+              <a:spcBef>
+                <a:spcPts val="0"/>
+              </a:spcBef>
+              <a:spcAft>
+                <a:spcPts val="0"/>
+              </a:spcAft>
+              <a:buNone/>
+            </a:pPr>
+            <a:r>
+              <a:rPr lang="en-US" sz="3200" dirty="0"/>
+              <a:t>The Data Analyst moving to Silicon Valley for a hot new start-up</a:t>
+            </a:r>
+          </a:p>
+        </p:txBody>
+      </p:sp>
+      <p:sp>
+        <p:nvSpPr>
+          <p:cNvPr id="277" name="Google Shape;277;ga479f66027_0_1"/>
+          <p:cNvSpPr txBox="1"/>
+          <p:nvPr/>
+        </p:nvSpPr>
+        <p:spPr>
+          <a:xfrm>
+            <a:off x="720400" y="1759789"/>
+            <a:ext cx="3552464" cy="4277086"/>
+          </a:xfrm>
+          <a:prstGeom prst="rect">
+            <a:avLst/>
+          </a:prstGeom>
+          <a:noFill/>
+          <a:ln>
+            <a:noFill/>
+          </a:ln>
+        </p:spPr>
+        <p:txBody>
+          <a:bodyPr spcFirstLastPara="1" wrap="square" lIns="91425" tIns="91425" rIns="91425" bIns="91425" anchor="t" anchorCtr="0">
+            <a:noAutofit/>
+          </a:bodyPr>
+          <a:lstStyle/>
+          <a:p>
+            <a:pPr marL="0" lvl="0" indent="0" algn="l" rtl="0">
+              <a:spcBef>
+                <a:spcPts val="0"/>
+              </a:spcBef>
+              <a:spcAft>
+                <a:spcPts val="0"/>
+              </a:spcAft>
+              <a:buNone/>
+            </a:pPr>
+            <a:endParaRPr lang="en-US" sz="1500" dirty="0">
+              <a:latin typeface="Twentieth Century"/>
+              <a:ea typeface="Twentieth Century"/>
+              <a:cs typeface="Twentieth Century"/>
+              <a:sym typeface="Twentieth Century"/>
+            </a:endParaRPr>
+          </a:p>
+        </p:txBody>
+      </p:sp>
+      <p:sp>
+        <p:nvSpPr>
+          <p:cNvPr id="278" name="Google Shape;278;ga479f66027_0_1"/>
+          <p:cNvSpPr txBox="1"/>
+          <p:nvPr/>
+        </p:nvSpPr>
+        <p:spPr>
+          <a:xfrm>
+            <a:off x="5401075" y="2353793"/>
+            <a:ext cx="1948200" cy="906000"/>
+          </a:xfrm>
+          <a:prstGeom prst="rect">
+            <a:avLst/>
+          </a:prstGeom>
+          <a:noFill/>
+          <a:ln>
+            <a:noFill/>
+          </a:ln>
+        </p:spPr>
+        <p:txBody>
+          <a:bodyPr spcFirstLastPara="1" wrap="square" lIns="91425" tIns="91425" rIns="91425" bIns="91425" anchor="t" anchorCtr="0">
+            <a:noAutofit/>
+          </a:bodyPr>
+          <a:lstStyle/>
+          <a:p>
+            <a:pPr marL="0" lvl="0" indent="0" algn="l" rtl="0">
+              <a:lnSpc>
+                <a:spcPct val="115000"/>
+              </a:lnSpc>
+              <a:spcBef>
+                <a:spcPts val="0"/>
+              </a:spcBef>
+              <a:spcAft>
+                <a:spcPts val="0"/>
+              </a:spcAft>
+              <a:buNone/>
+            </a:pPr>
+            <a:endParaRPr sz="1500" dirty="0">
+              <a:latin typeface="Twentieth Century"/>
+              <a:ea typeface="Twentieth Century"/>
+              <a:cs typeface="Twentieth Century"/>
+              <a:sym typeface="Twentieth Century"/>
+            </a:endParaRPr>
+          </a:p>
+          <a:p>
+            <a:pPr marL="0" lvl="0" indent="0" algn="l" rtl="0">
+              <a:spcBef>
+                <a:spcPts val="0"/>
+              </a:spcBef>
+              <a:spcAft>
+                <a:spcPts val="0"/>
+              </a:spcAft>
+              <a:buNone/>
+            </a:pPr>
+            <a:endParaRPr sz="1500" dirty="0">
+              <a:latin typeface="Twentieth Century"/>
+              <a:ea typeface="Twentieth Century"/>
+              <a:cs typeface="Twentieth Century"/>
+              <a:sym typeface="Twentieth Century"/>
+            </a:endParaRPr>
+          </a:p>
+        </p:txBody>
+      </p:sp>
+      <p:pic>
+        <p:nvPicPr>
+          <p:cNvPr id="4" name="Picture 3">
+            <a:extLst>
+              <a:ext uri="{FF2B5EF4-FFF2-40B4-BE49-F238E27FC236}">
+                <a16:creationId xmlns:a16="http://schemas.microsoft.com/office/drawing/2014/main" id="{50C9E1C0-5154-3CD9-D95D-5727D08B9204}"/>
+              </a:ext>
+            </a:extLst>
+          </p:cNvPr>
+          <p:cNvPicPr>
+            <a:picLocks noChangeAspect="1"/>
+          </p:cNvPicPr>
+          <p:nvPr/>
+        </p:nvPicPr>
+        <p:blipFill>
+          <a:blip r:embed="rId3"/>
+          <a:stretch>
+            <a:fillRect/>
+          </a:stretch>
+        </p:blipFill>
+        <p:spPr>
+          <a:xfrm>
+            <a:off x="635480" y="2235955"/>
+            <a:ext cx="5646332" cy="3853080"/>
+          </a:xfrm>
+          <a:prstGeom prst="rect">
+            <a:avLst/>
+          </a:prstGeom>
+        </p:spPr>
+      </p:pic>
+      <p:sp>
+        <p:nvSpPr>
+          <p:cNvPr id="5" name="TextBox 4">
+            <a:extLst>
+              <a:ext uri="{FF2B5EF4-FFF2-40B4-BE49-F238E27FC236}">
+                <a16:creationId xmlns:a16="http://schemas.microsoft.com/office/drawing/2014/main" id="{27FDF9AA-DC09-C98F-4825-0E2769AC85F7}"/>
+              </a:ext>
+            </a:extLst>
+          </p:cNvPr>
+          <p:cNvSpPr txBox="1"/>
+          <p:nvPr/>
+        </p:nvSpPr>
+        <p:spPr>
+          <a:xfrm>
+            <a:off x="720400" y="1264285"/>
+            <a:ext cx="6219645" cy="369332"/>
+          </a:xfrm>
+          <a:prstGeom prst="rect">
+            <a:avLst/>
+          </a:prstGeom>
+          <a:noFill/>
+        </p:spPr>
+        <p:txBody>
+          <a:bodyPr wrap="square" rtlCol="0">
+            <a:spAutoFit/>
+          </a:bodyPr>
+          <a:lstStyle/>
+          <a:p>
+            <a:r>
+              <a:rPr lang="en-US" dirty="0"/>
+              <a:t>County: Santa Clara, City: San Jose, Neighborhood: Evergreen</a:t>
+            </a:r>
+          </a:p>
+        </p:txBody>
+      </p:sp>
+      <p:graphicFrame>
+        <p:nvGraphicFramePr>
+          <p:cNvPr id="2" name="Table 1">
+            <a:extLst>
+              <a:ext uri="{FF2B5EF4-FFF2-40B4-BE49-F238E27FC236}">
+                <a16:creationId xmlns:a16="http://schemas.microsoft.com/office/drawing/2014/main" id="{A729CC44-65CE-2478-1A3C-D82E0CFDA5DD}"/>
+              </a:ext>
+            </a:extLst>
+          </p:cNvPr>
+          <p:cNvGraphicFramePr>
+            <a:graphicFrameLocks noGrp="1"/>
+          </p:cNvGraphicFramePr>
+          <p:nvPr>
+            <p:extLst>
+              <p:ext uri="{D42A27DB-BD31-4B8C-83A1-F6EECF244321}">
+                <p14:modId xmlns:p14="http://schemas.microsoft.com/office/powerpoint/2010/main" val="4270591541"/>
+              </p:ext>
+            </p:extLst>
+          </p:nvPr>
+        </p:nvGraphicFramePr>
+        <p:xfrm>
+          <a:off x="7133456" y="4463435"/>
+          <a:ext cx="2781300" cy="1625600"/>
+        </p:xfrm>
+        <a:graphic>
+          <a:graphicData uri="http://schemas.openxmlformats.org/drawingml/2006/table">
+            <a:tbl>
+              <a:tblPr>
+                <a:tableStyleId>{5C22544A-7EE6-4342-B048-85BDC9FD1C3A}</a:tableStyleId>
+              </a:tblPr>
+              <a:tblGrid>
+                <a:gridCol w="827730">
+                  <a:extLst>
+                    <a:ext uri="{9D8B030D-6E8A-4147-A177-3AD203B41FA5}">
+                      <a16:colId xmlns:a16="http://schemas.microsoft.com/office/drawing/2014/main" val="220663382"/>
+                    </a:ext>
+                  </a:extLst>
+                </a:gridCol>
+                <a:gridCol w="1002156">
+                  <a:extLst>
+                    <a:ext uri="{9D8B030D-6E8A-4147-A177-3AD203B41FA5}">
+                      <a16:colId xmlns:a16="http://schemas.microsoft.com/office/drawing/2014/main" val="60156366"/>
+                    </a:ext>
+                  </a:extLst>
+                </a:gridCol>
+                <a:gridCol w="951414">
+                  <a:extLst>
+                    <a:ext uri="{9D8B030D-6E8A-4147-A177-3AD203B41FA5}">
+                      <a16:colId xmlns:a16="http://schemas.microsoft.com/office/drawing/2014/main" val="137982632"/>
+                    </a:ext>
+                  </a:extLst>
+                </a:gridCol>
+              </a:tblGrid>
+              <a:tr h="203200">
+                <a:tc>
+                  <a:txBody>
+                    <a:bodyPr/>
+                    <a:lstStyle/>
+                    <a:p>
+                      <a:pPr algn="l" fontAlgn="b"/>
+                      <a:r>
+                        <a:rPr lang="en-US" sz="1200" u="none" strike="noStrike" dirty="0">
+                          <a:effectLst/>
+                        </a:rPr>
+                        <a:t>ate</a:t>
+                      </a:r>
+                      <a:endParaRPr lang="en-US" sz="1200" b="1" i="0" u="none" strike="noStrike" dirty="0">
+                        <a:solidFill>
+                          <a:srgbClr val="FFFFFF"/>
+                        </a:solidFill>
+                        <a:effectLst/>
+                        <a:latin typeface="Calibri" panose="020F0502020204030204" pitchFamily="34" charset="0"/>
+                      </a:endParaRPr>
+                    </a:p>
+                  </a:txBody>
+                  <a:tcPr marL="9525" marR="9525" marT="9525" marB="0" anchor="b"/>
+                </a:tc>
+                <a:tc>
+                  <a:txBody>
+                    <a:bodyPr/>
+                    <a:lstStyle/>
+                    <a:p>
+                      <a:pPr algn="l" fontAlgn="b"/>
+                      <a:r>
+                        <a:rPr lang="en-US" sz="1200" u="none" strike="noStrike">
+                          <a:effectLst/>
+                        </a:rPr>
+                        <a:t>Actual Price</a:t>
+                      </a:r>
+                      <a:endParaRPr lang="en-US" sz="1200" b="1" i="0" u="none" strike="noStrike">
+                        <a:solidFill>
+                          <a:srgbClr val="FFFFFF"/>
+                        </a:solidFill>
+                        <a:effectLst/>
+                        <a:latin typeface="Calibri" panose="020F0502020204030204" pitchFamily="34" charset="0"/>
+                      </a:endParaRPr>
+                    </a:p>
+                  </a:txBody>
+                  <a:tcPr marL="9525" marR="9525" marT="9525" marB="0" anchor="b"/>
+                </a:tc>
+                <a:tc>
+                  <a:txBody>
+                    <a:bodyPr/>
+                    <a:lstStyle/>
+                    <a:p>
+                      <a:pPr algn="l" fontAlgn="b"/>
+                      <a:r>
+                        <a:rPr lang="en-US" sz="1200" u="none" strike="noStrike">
+                          <a:effectLst/>
+                        </a:rPr>
+                        <a:t>Predictions</a:t>
+                      </a:r>
+                      <a:endParaRPr lang="en-US" sz="1200" b="1" i="0" u="none" strike="noStrike">
+                        <a:solidFill>
+                          <a:srgbClr val="FFFFFF"/>
+                        </a:solidFill>
+                        <a:effectLst/>
+                        <a:latin typeface="Calibri" panose="020F0502020204030204" pitchFamily="34" charset="0"/>
+                      </a:endParaRPr>
+                    </a:p>
+                  </a:txBody>
+                  <a:tcPr marL="9525" marR="9525" marT="9525" marB="0" anchor="b"/>
+                </a:tc>
+                <a:extLst>
+                  <a:ext uri="{0D108BD9-81ED-4DB2-BD59-A6C34878D82A}">
+                    <a16:rowId xmlns:a16="http://schemas.microsoft.com/office/drawing/2014/main" val="3757670743"/>
+                  </a:ext>
+                </a:extLst>
+              </a:tr>
+              <a:tr h="203200">
+                <a:tc>
+                  <a:txBody>
+                    <a:bodyPr/>
+                    <a:lstStyle/>
+                    <a:p>
+                      <a:pPr algn="r" fontAlgn="b"/>
+                      <a:r>
+                        <a:rPr lang="en-US" sz="1200" u="none" strike="noStrike" dirty="0">
+                          <a:effectLst/>
+                        </a:rPr>
+                        <a:t>7/31/22</a:t>
+                      </a:r>
+                      <a:endParaRPr lang="en-US" sz="1200" b="0" i="0" u="none" strike="noStrike" dirty="0">
+                        <a:solidFill>
+                          <a:srgbClr val="000000"/>
+                        </a:solidFill>
+                        <a:effectLst/>
+                        <a:latin typeface="Helvetica Neue" panose="02000503000000020004" pitchFamily="2" charset="0"/>
+                      </a:endParaRPr>
+                    </a:p>
+                  </a:txBody>
+                  <a:tcPr marL="9525" marR="9525" marT="9525" marB="0" anchor="b"/>
+                </a:tc>
+                <a:tc>
+                  <a:txBody>
+                    <a:bodyPr/>
+                    <a:lstStyle/>
+                    <a:p>
+                      <a:pPr algn="r" fontAlgn="b"/>
+                      <a:r>
+                        <a:rPr lang="en-US" sz="1200" u="none" strike="noStrike">
+                          <a:effectLst/>
+                        </a:rPr>
+                        <a:t>1060773</a:t>
+                      </a:r>
+                      <a:endParaRPr lang="en-US" sz="1200" b="0" i="0" u="none" strike="noStrike">
+                        <a:solidFill>
+                          <a:srgbClr val="000000"/>
+                        </a:solidFill>
+                        <a:effectLst/>
+                        <a:latin typeface="Helvetica Neue" panose="02000503000000020004" pitchFamily="2" charset="0"/>
+                      </a:endParaRPr>
+                    </a:p>
+                  </a:txBody>
+                  <a:tcPr marL="9525" marR="9525" marT="9525" marB="0" anchor="b"/>
+                </a:tc>
+                <a:tc>
+                  <a:txBody>
+                    <a:bodyPr/>
+                    <a:lstStyle/>
+                    <a:p>
+                      <a:pPr algn="r" fontAlgn="b"/>
+                      <a:r>
+                        <a:rPr lang="en-US" sz="1200" u="none" strike="noStrike">
+                          <a:effectLst/>
+                        </a:rPr>
+                        <a:t>1059731</a:t>
+                      </a:r>
+                      <a:endParaRPr lang="en-US" sz="1200" b="0" i="0" u="none" strike="noStrike">
+                        <a:solidFill>
+                          <a:srgbClr val="000000"/>
+                        </a:solidFill>
+                        <a:effectLst/>
+                        <a:latin typeface="Helvetica Neue" panose="02000503000000020004" pitchFamily="2" charset="0"/>
+                      </a:endParaRPr>
+                    </a:p>
+                  </a:txBody>
+                  <a:tcPr marL="9525" marR="9525" marT="9525" marB="0" anchor="b"/>
+                </a:tc>
+                <a:extLst>
+                  <a:ext uri="{0D108BD9-81ED-4DB2-BD59-A6C34878D82A}">
+                    <a16:rowId xmlns:a16="http://schemas.microsoft.com/office/drawing/2014/main" val="1798936489"/>
+                  </a:ext>
+                </a:extLst>
+              </a:tr>
+              <a:tr h="203200">
+                <a:tc>
+                  <a:txBody>
+                    <a:bodyPr/>
+                    <a:lstStyle/>
+                    <a:p>
+                      <a:pPr algn="r" fontAlgn="b"/>
+                      <a:r>
+                        <a:rPr lang="en-US" sz="1200" u="none" strike="noStrike">
+                          <a:effectLst/>
+                        </a:rPr>
+                        <a:t>8/31/22</a:t>
+                      </a:r>
+                      <a:endParaRPr lang="en-US" sz="1200" b="0" i="0" u="none" strike="noStrike">
+                        <a:solidFill>
+                          <a:srgbClr val="000000"/>
+                        </a:solidFill>
+                        <a:effectLst/>
+                        <a:latin typeface="Helvetica Neue" panose="02000503000000020004" pitchFamily="2" charset="0"/>
+                      </a:endParaRPr>
+                    </a:p>
+                  </a:txBody>
+                  <a:tcPr marL="9525" marR="9525" marT="9525" marB="0" anchor="b"/>
+                </a:tc>
+                <a:tc>
+                  <a:txBody>
+                    <a:bodyPr/>
+                    <a:lstStyle/>
+                    <a:p>
+                      <a:pPr algn="r" fontAlgn="b"/>
+                      <a:r>
+                        <a:rPr lang="en-US" sz="1200" u="none" strike="noStrike">
+                          <a:effectLst/>
+                        </a:rPr>
+                        <a:t>1058587</a:t>
+                      </a:r>
+                      <a:endParaRPr lang="en-US" sz="1200" b="0" i="0" u="none" strike="noStrike">
+                        <a:solidFill>
+                          <a:srgbClr val="000000"/>
+                        </a:solidFill>
+                        <a:effectLst/>
+                        <a:latin typeface="Helvetica Neue" panose="02000503000000020004" pitchFamily="2" charset="0"/>
+                      </a:endParaRPr>
+                    </a:p>
+                  </a:txBody>
+                  <a:tcPr marL="9525" marR="9525" marT="9525" marB="0" anchor="b"/>
+                </a:tc>
+                <a:tc>
+                  <a:txBody>
+                    <a:bodyPr/>
+                    <a:lstStyle/>
+                    <a:p>
+                      <a:pPr algn="r" fontAlgn="b"/>
+                      <a:r>
+                        <a:rPr lang="en-US" sz="1200" u="none" strike="noStrike">
+                          <a:effectLst/>
+                        </a:rPr>
+                        <a:t>1071799</a:t>
+                      </a:r>
+                      <a:endParaRPr lang="en-US" sz="1200" b="0" i="0" u="none" strike="noStrike">
+                        <a:solidFill>
+                          <a:srgbClr val="000000"/>
+                        </a:solidFill>
+                        <a:effectLst/>
+                        <a:latin typeface="Helvetica Neue" panose="02000503000000020004" pitchFamily="2" charset="0"/>
+                      </a:endParaRPr>
+                    </a:p>
+                  </a:txBody>
+                  <a:tcPr marL="9525" marR="9525" marT="9525" marB="0" anchor="b"/>
+                </a:tc>
+                <a:extLst>
+                  <a:ext uri="{0D108BD9-81ED-4DB2-BD59-A6C34878D82A}">
+                    <a16:rowId xmlns:a16="http://schemas.microsoft.com/office/drawing/2014/main" val="2856730718"/>
+                  </a:ext>
+                </a:extLst>
+              </a:tr>
+              <a:tr h="203200">
+                <a:tc>
+                  <a:txBody>
+                    <a:bodyPr/>
+                    <a:lstStyle/>
+                    <a:p>
+                      <a:pPr algn="r" fontAlgn="b"/>
+                      <a:r>
+                        <a:rPr lang="en-US" sz="1200" u="none" strike="noStrike">
+                          <a:effectLst/>
+                        </a:rPr>
+                        <a:t>9/30/22</a:t>
+                      </a:r>
+                      <a:endParaRPr lang="en-US" sz="1200" b="0" i="0" u="none" strike="noStrike">
+                        <a:solidFill>
+                          <a:srgbClr val="000000"/>
+                        </a:solidFill>
+                        <a:effectLst/>
+                        <a:latin typeface="Helvetica Neue" panose="02000503000000020004" pitchFamily="2" charset="0"/>
+                      </a:endParaRPr>
+                    </a:p>
+                  </a:txBody>
+                  <a:tcPr marL="9525" marR="9525" marT="9525" marB="0" anchor="b"/>
+                </a:tc>
+                <a:tc>
+                  <a:txBody>
+                    <a:bodyPr/>
+                    <a:lstStyle/>
+                    <a:p>
+                      <a:pPr algn="r" fontAlgn="b"/>
+                      <a:r>
+                        <a:rPr lang="en-US" sz="1200" u="none" strike="noStrike">
+                          <a:effectLst/>
+                        </a:rPr>
+                        <a:t>1052060</a:t>
+                      </a:r>
+                      <a:endParaRPr lang="en-US" sz="1200" b="0" i="0" u="none" strike="noStrike">
+                        <a:solidFill>
+                          <a:srgbClr val="000000"/>
+                        </a:solidFill>
+                        <a:effectLst/>
+                        <a:latin typeface="Helvetica Neue" panose="02000503000000020004" pitchFamily="2" charset="0"/>
+                      </a:endParaRPr>
+                    </a:p>
+                  </a:txBody>
+                  <a:tcPr marL="9525" marR="9525" marT="9525" marB="0" anchor="b"/>
+                </a:tc>
+                <a:tc>
+                  <a:txBody>
+                    <a:bodyPr/>
+                    <a:lstStyle/>
+                    <a:p>
+                      <a:pPr algn="r" fontAlgn="b"/>
+                      <a:r>
+                        <a:rPr lang="en-US" sz="1200" u="none" strike="noStrike">
+                          <a:effectLst/>
+                        </a:rPr>
+                        <a:t>1077836</a:t>
+                      </a:r>
+                      <a:endParaRPr lang="en-US" sz="1200" b="0" i="0" u="none" strike="noStrike">
+                        <a:solidFill>
+                          <a:srgbClr val="000000"/>
+                        </a:solidFill>
+                        <a:effectLst/>
+                        <a:latin typeface="Helvetica Neue" panose="02000503000000020004" pitchFamily="2" charset="0"/>
+                      </a:endParaRPr>
+                    </a:p>
+                  </a:txBody>
+                  <a:tcPr marL="9525" marR="9525" marT="9525" marB="0" anchor="b"/>
+                </a:tc>
+                <a:extLst>
+                  <a:ext uri="{0D108BD9-81ED-4DB2-BD59-A6C34878D82A}">
+                    <a16:rowId xmlns:a16="http://schemas.microsoft.com/office/drawing/2014/main" val="3887759538"/>
+                  </a:ext>
+                </a:extLst>
+              </a:tr>
+              <a:tr h="203200">
+                <a:tc>
+                  <a:txBody>
+                    <a:bodyPr/>
+                    <a:lstStyle/>
+                    <a:p>
+                      <a:pPr algn="r" fontAlgn="b"/>
+                      <a:r>
+                        <a:rPr lang="en-US" sz="1200" u="none" strike="noStrike">
+                          <a:effectLst/>
+                        </a:rPr>
+                        <a:t>10/31/22</a:t>
+                      </a:r>
+                      <a:endParaRPr lang="en-US" sz="1200" b="0" i="0" u="none" strike="noStrike">
+                        <a:solidFill>
+                          <a:srgbClr val="000000"/>
+                        </a:solidFill>
+                        <a:effectLst/>
+                        <a:latin typeface="Helvetica Neue" panose="02000503000000020004" pitchFamily="2" charset="0"/>
+                      </a:endParaRPr>
+                    </a:p>
+                  </a:txBody>
+                  <a:tcPr marL="9525" marR="9525" marT="9525" marB="0" anchor="b"/>
+                </a:tc>
+                <a:tc>
+                  <a:txBody>
+                    <a:bodyPr/>
+                    <a:lstStyle/>
+                    <a:p>
+                      <a:pPr algn="r" fontAlgn="b"/>
+                      <a:r>
+                        <a:rPr lang="en-US" sz="1200" u="none" strike="noStrike">
+                          <a:effectLst/>
+                        </a:rPr>
+                        <a:t>1046377</a:t>
+                      </a:r>
+                      <a:endParaRPr lang="en-US" sz="1200" b="0" i="0" u="none" strike="noStrike">
+                        <a:solidFill>
+                          <a:srgbClr val="000000"/>
+                        </a:solidFill>
+                        <a:effectLst/>
+                        <a:latin typeface="Helvetica Neue" panose="02000503000000020004" pitchFamily="2" charset="0"/>
+                      </a:endParaRPr>
+                    </a:p>
+                  </a:txBody>
+                  <a:tcPr marL="9525" marR="9525" marT="9525" marB="0" anchor="b"/>
+                </a:tc>
+                <a:tc>
+                  <a:txBody>
+                    <a:bodyPr/>
+                    <a:lstStyle/>
+                    <a:p>
+                      <a:pPr algn="r" fontAlgn="b"/>
+                      <a:r>
+                        <a:rPr lang="en-US" sz="1200" u="none" strike="noStrike" dirty="0">
+                          <a:effectLst/>
+                        </a:rPr>
+                        <a:t>1086349</a:t>
+                      </a:r>
+                      <a:endParaRPr lang="en-US" sz="1200" b="0" i="0" u="none" strike="noStrike" dirty="0">
+                        <a:solidFill>
+                          <a:srgbClr val="000000"/>
+                        </a:solidFill>
+                        <a:effectLst/>
+                        <a:latin typeface="Helvetica Neue" panose="02000503000000020004" pitchFamily="2" charset="0"/>
+                      </a:endParaRPr>
+                    </a:p>
+                  </a:txBody>
+                  <a:tcPr marL="9525" marR="9525" marT="9525" marB="0" anchor="b"/>
+                </a:tc>
+                <a:extLst>
+                  <a:ext uri="{0D108BD9-81ED-4DB2-BD59-A6C34878D82A}">
+                    <a16:rowId xmlns:a16="http://schemas.microsoft.com/office/drawing/2014/main" val="1081187073"/>
+                  </a:ext>
+                </a:extLst>
+              </a:tr>
+              <a:tr h="203200">
+                <a:tc>
+                  <a:txBody>
+                    <a:bodyPr/>
+                    <a:lstStyle/>
+                    <a:p>
+                      <a:pPr algn="r" fontAlgn="b"/>
+                      <a:r>
+                        <a:rPr lang="en-US" sz="1200" u="none" strike="noStrike">
+                          <a:effectLst/>
+                        </a:rPr>
+                        <a:t>11/30/22</a:t>
+                      </a:r>
+                      <a:endParaRPr lang="en-US" sz="1200" b="0" i="0" u="none" strike="noStrike">
+                        <a:solidFill>
+                          <a:srgbClr val="000000"/>
+                        </a:solidFill>
+                        <a:effectLst/>
+                        <a:latin typeface="Helvetica Neue" panose="02000503000000020004" pitchFamily="2" charset="0"/>
+                      </a:endParaRPr>
+                    </a:p>
+                  </a:txBody>
+                  <a:tcPr marL="9525" marR="9525" marT="9525" marB="0" anchor="b"/>
+                </a:tc>
+                <a:tc>
+                  <a:txBody>
+                    <a:bodyPr/>
+                    <a:lstStyle/>
+                    <a:p>
+                      <a:pPr algn="r" fontAlgn="b"/>
+                      <a:r>
+                        <a:rPr lang="en-US" sz="1200" u="none" strike="noStrike">
+                          <a:effectLst/>
+                        </a:rPr>
+                        <a:t>1042506</a:t>
+                      </a:r>
+                      <a:endParaRPr lang="en-US" sz="1200" b="0" i="0" u="none" strike="noStrike">
+                        <a:solidFill>
+                          <a:srgbClr val="000000"/>
+                        </a:solidFill>
+                        <a:effectLst/>
+                        <a:latin typeface="Helvetica Neue" panose="02000503000000020004" pitchFamily="2" charset="0"/>
+                      </a:endParaRPr>
+                    </a:p>
+                  </a:txBody>
+                  <a:tcPr marL="9525" marR="9525" marT="9525" marB="0" anchor="b"/>
+                </a:tc>
+                <a:tc>
+                  <a:txBody>
+                    <a:bodyPr/>
+                    <a:lstStyle/>
+                    <a:p>
+                      <a:pPr algn="r" fontAlgn="b"/>
+                      <a:r>
+                        <a:rPr lang="en-US" sz="1200" u="none" strike="noStrike">
+                          <a:effectLst/>
+                        </a:rPr>
+                        <a:t>1099054</a:t>
+                      </a:r>
+                      <a:endParaRPr lang="en-US" sz="1200" b="0" i="0" u="none" strike="noStrike">
+                        <a:solidFill>
+                          <a:srgbClr val="000000"/>
+                        </a:solidFill>
+                        <a:effectLst/>
+                        <a:latin typeface="Helvetica Neue" panose="02000503000000020004" pitchFamily="2" charset="0"/>
+                      </a:endParaRPr>
+                    </a:p>
+                  </a:txBody>
+                  <a:tcPr marL="9525" marR="9525" marT="9525" marB="0" anchor="b"/>
+                </a:tc>
+                <a:extLst>
+                  <a:ext uri="{0D108BD9-81ED-4DB2-BD59-A6C34878D82A}">
+                    <a16:rowId xmlns:a16="http://schemas.microsoft.com/office/drawing/2014/main" val="2124279724"/>
+                  </a:ext>
+                </a:extLst>
+              </a:tr>
+              <a:tr h="203200">
+                <a:tc>
+                  <a:txBody>
+                    <a:bodyPr/>
+                    <a:lstStyle/>
+                    <a:p>
+                      <a:pPr algn="r" fontAlgn="b"/>
+                      <a:r>
+                        <a:rPr lang="en-US" sz="1200" u="none" strike="noStrike">
+                          <a:effectLst/>
+                        </a:rPr>
+                        <a:t>12/31/22</a:t>
+                      </a:r>
+                      <a:endParaRPr lang="en-US" sz="1200" b="0" i="0" u="none" strike="noStrike">
+                        <a:solidFill>
+                          <a:srgbClr val="000000"/>
+                        </a:solidFill>
+                        <a:effectLst/>
+                        <a:latin typeface="Helvetica Neue" panose="02000503000000020004" pitchFamily="2" charset="0"/>
+                      </a:endParaRPr>
+                    </a:p>
+                  </a:txBody>
+                  <a:tcPr marL="9525" marR="9525" marT="9525" marB="0" anchor="b"/>
+                </a:tc>
+                <a:tc>
+                  <a:txBody>
+                    <a:bodyPr/>
+                    <a:lstStyle/>
+                    <a:p>
+                      <a:pPr algn="r" fontAlgn="b"/>
+                      <a:r>
+                        <a:rPr lang="en-US" sz="1200" u="none" strike="noStrike" dirty="0">
+                          <a:effectLst/>
+                        </a:rPr>
+                        <a:t>1038902</a:t>
+                      </a:r>
+                      <a:endParaRPr lang="en-US" sz="1200" b="0" i="0" u="none" strike="noStrike" dirty="0">
+                        <a:solidFill>
+                          <a:srgbClr val="000000"/>
+                        </a:solidFill>
+                        <a:effectLst/>
+                        <a:latin typeface="Helvetica Neue" panose="02000503000000020004" pitchFamily="2" charset="0"/>
+                      </a:endParaRPr>
+                    </a:p>
+                  </a:txBody>
+                  <a:tcPr marL="9525" marR="9525" marT="9525" marB="0" anchor="b"/>
+                </a:tc>
+                <a:tc>
+                  <a:txBody>
+                    <a:bodyPr/>
+                    <a:lstStyle/>
+                    <a:p>
+                      <a:pPr algn="r" fontAlgn="b"/>
+                      <a:r>
+                        <a:rPr lang="en-US" sz="1200" u="none" strike="noStrike">
+                          <a:effectLst/>
+                        </a:rPr>
+                        <a:t>1114281</a:t>
+                      </a:r>
+                      <a:endParaRPr lang="en-US" sz="1200" b="0" i="0" u="none" strike="noStrike">
+                        <a:solidFill>
+                          <a:srgbClr val="000000"/>
+                        </a:solidFill>
+                        <a:effectLst/>
+                        <a:latin typeface="Helvetica Neue" panose="02000503000000020004" pitchFamily="2" charset="0"/>
+                      </a:endParaRPr>
+                    </a:p>
+                  </a:txBody>
+                  <a:tcPr marL="9525" marR="9525" marT="9525" marB="0" anchor="b"/>
+                </a:tc>
+                <a:extLst>
+                  <a:ext uri="{0D108BD9-81ED-4DB2-BD59-A6C34878D82A}">
+                    <a16:rowId xmlns:a16="http://schemas.microsoft.com/office/drawing/2014/main" val="1471483723"/>
+                  </a:ext>
+                </a:extLst>
+              </a:tr>
+              <a:tr h="203200">
+                <a:tc>
+                  <a:txBody>
+                    <a:bodyPr/>
+                    <a:lstStyle/>
+                    <a:p>
+                      <a:pPr algn="r" fontAlgn="b"/>
+                      <a:r>
+                        <a:rPr lang="en-US" sz="1200" u="none" strike="noStrike">
+                          <a:effectLst/>
+                        </a:rPr>
+                        <a:t>1/31/23</a:t>
+                      </a:r>
+                      <a:endParaRPr lang="en-US" sz="1200" b="0" i="0" u="none" strike="noStrike">
+                        <a:solidFill>
+                          <a:srgbClr val="000000"/>
+                        </a:solidFill>
+                        <a:effectLst/>
+                        <a:latin typeface="Helvetica Neue" panose="02000503000000020004" pitchFamily="2" charset="0"/>
+                      </a:endParaRPr>
+                    </a:p>
+                  </a:txBody>
+                  <a:tcPr marL="9525" marR="9525" marT="9525" marB="0" anchor="b"/>
+                </a:tc>
+                <a:tc>
+                  <a:txBody>
+                    <a:bodyPr/>
+                    <a:lstStyle/>
+                    <a:p>
+                      <a:pPr algn="r" fontAlgn="b"/>
+                      <a:r>
+                        <a:rPr lang="en-US" sz="1200" u="none" strike="noStrike">
+                          <a:effectLst/>
+                        </a:rPr>
+                        <a:t>1039407</a:t>
+                      </a:r>
+                      <a:endParaRPr lang="en-US" sz="1200" b="0" i="0" u="none" strike="noStrike">
+                        <a:solidFill>
+                          <a:srgbClr val="000000"/>
+                        </a:solidFill>
+                        <a:effectLst/>
+                        <a:latin typeface="Helvetica Neue" panose="02000503000000020004" pitchFamily="2" charset="0"/>
+                      </a:endParaRPr>
+                    </a:p>
+                  </a:txBody>
+                  <a:tcPr marL="9525" marR="9525" marT="9525" marB="0" anchor="b"/>
+                </a:tc>
+                <a:tc>
+                  <a:txBody>
+                    <a:bodyPr/>
+                    <a:lstStyle/>
+                    <a:p>
+                      <a:pPr algn="r" fontAlgn="b"/>
+                      <a:r>
+                        <a:rPr lang="en-US" sz="1200" u="none" strike="noStrike" dirty="0">
+                          <a:effectLst/>
+                        </a:rPr>
+                        <a:t>1136267</a:t>
+                      </a:r>
+                      <a:endParaRPr lang="en-US" sz="1200" b="0" i="0" u="none" strike="noStrike" dirty="0">
+                        <a:solidFill>
+                          <a:srgbClr val="000000"/>
+                        </a:solidFill>
+                        <a:effectLst/>
+                        <a:latin typeface="Helvetica Neue" panose="02000503000000020004" pitchFamily="2" charset="0"/>
+                      </a:endParaRPr>
+                    </a:p>
+                  </a:txBody>
+                  <a:tcPr marL="9525" marR="9525" marT="9525" marB="0" anchor="b"/>
+                </a:tc>
+                <a:extLst>
+                  <a:ext uri="{0D108BD9-81ED-4DB2-BD59-A6C34878D82A}">
+                    <a16:rowId xmlns:a16="http://schemas.microsoft.com/office/drawing/2014/main" val="2413597617"/>
+                  </a:ext>
+                </a:extLst>
+              </a:tr>
+            </a:tbl>
+          </a:graphicData>
+        </a:graphic>
+      </p:graphicFrame>
+      <p:graphicFrame>
+        <p:nvGraphicFramePr>
+          <p:cNvPr id="3" name="Table 2">
+            <a:extLst>
+              <a:ext uri="{FF2B5EF4-FFF2-40B4-BE49-F238E27FC236}">
+                <a16:creationId xmlns:a16="http://schemas.microsoft.com/office/drawing/2014/main" id="{EA08D8D2-8DA2-6CCF-6855-E99729D658F7}"/>
+              </a:ext>
+            </a:extLst>
+          </p:cNvPr>
+          <p:cNvGraphicFramePr>
+            <a:graphicFrameLocks noGrp="1"/>
+          </p:cNvGraphicFramePr>
+          <p:nvPr>
+            <p:extLst>
+              <p:ext uri="{D42A27DB-BD31-4B8C-83A1-F6EECF244321}">
+                <p14:modId xmlns:p14="http://schemas.microsoft.com/office/powerpoint/2010/main" val="378088038"/>
+              </p:ext>
+            </p:extLst>
+          </p:nvPr>
+        </p:nvGraphicFramePr>
+        <p:xfrm>
+          <a:off x="7036551" y="4463435"/>
+          <a:ext cx="4216399" cy="1625600"/>
+        </p:xfrm>
+        <a:graphic>
+          <a:graphicData uri="http://schemas.openxmlformats.org/drawingml/2006/table">
+            <a:tbl>
+              <a:tblPr>
+                <a:tableStyleId>{5C22544A-7EE6-4342-B048-85BDC9FD1C3A}</a:tableStyleId>
+              </a:tblPr>
+              <a:tblGrid>
+                <a:gridCol w="826186">
+                  <a:extLst>
+                    <a:ext uri="{9D8B030D-6E8A-4147-A177-3AD203B41FA5}">
+                      <a16:colId xmlns:a16="http://schemas.microsoft.com/office/drawing/2014/main" val="1149443887"/>
+                    </a:ext>
+                  </a:extLst>
+                </a:gridCol>
+                <a:gridCol w="1130071">
+                  <a:extLst>
+                    <a:ext uri="{9D8B030D-6E8A-4147-A177-3AD203B41FA5}">
+                      <a16:colId xmlns:a16="http://schemas.microsoft.com/office/drawing/2014/main" val="447198337"/>
+                    </a:ext>
+                  </a:extLst>
+                </a:gridCol>
+                <a:gridCol w="1130071">
+                  <a:extLst>
+                    <a:ext uri="{9D8B030D-6E8A-4147-A177-3AD203B41FA5}">
+                      <a16:colId xmlns:a16="http://schemas.microsoft.com/office/drawing/2014/main" val="728399686"/>
+                    </a:ext>
+                  </a:extLst>
+                </a:gridCol>
+                <a:gridCol w="1130071">
+                  <a:extLst>
+                    <a:ext uri="{9D8B030D-6E8A-4147-A177-3AD203B41FA5}">
+                      <a16:colId xmlns:a16="http://schemas.microsoft.com/office/drawing/2014/main" val="885038569"/>
+                    </a:ext>
+                  </a:extLst>
+                </a:gridCol>
+              </a:tblGrid>
+              <a:tr h="203200">
+                <a:tc>
+                  <a:txBody>
+                    <a:bodyPr/>
+                    <a:lstStyle/>
+                    <a:p>
+                      <a:pPr algn="l" fontAlgn="b"/>
+                      <a:r>
+                        <a:rPr lang="en-US" sz="1200" u="none" strike="noStrike">
+                          <a:effectLst/>
+                        </a:rPr>
+                        <a:t>Dates</a:t>
+                      </a:r>
+                      <a:endParaRPr lang="en-US" sz="1200" b="0" i="0" u="none" strike="noStrike">
+                        <a:solidFill>
+                          <a:srgbClr val="000000"/>
+                        </a:solidFill>
+                        <a:effectLst/>
+                        <a:latin typeface="Calibri" panose="020F0502020204030204" pitchFamily="34" charset="0"/>
+                      </a:endParaRPr>
+                    </a:p>
+                  </a:txBody>
+                  <a:tcPr marL="9525" marR="9525" marT="9525" marB="0" anchor="b"/>
+                </a:tc>
+                <a:tc>
+                  <a:txBody>
+                    <a:bodyPr/>
+                    <a:lstStyle/>
+                    <a:p>
+                      <a:pPr algn="l" fontAlgn="b"/>
+                      <a:r>
+                        <a:rPr lang="en-US" sz="1200" u="none" strike="noStrike">
+                          <a:effectLst/>
+                        </a:rPr>
+                        <a:t>Trend</a:t>
+                      </a:r>
+                      <a:endParaRPr lang="en-US" sz="1200" b="0" i="0" u="none" strike="noStrike">
+                        <a:solidFill>
+                          <a:srgbClr val="000000"/>
+                        </a:solidFill>
+                        <a:effectLst/>
+                        <a:latin typeface="Calibri" panose="020F0502020204030204" pitchFamily="34" charset="0"/>
+                      </a:endParaRPr>
+                    </a:p>
+                  </a:txBody>
+                  <a:tcPr marL="9525" marR="9525" marT="9525" marB="0" anchor="b"/>
+                </a:tc>
+                <a:tc>
+                  <a:txBody>
+                    <a:bodyPr/>
+                    <a:lstStyle/>
+                    <a:p>
+                      <a:pPr algn="l" fontAlgn="b"/>
+                      <a:r>
+                        <a:rPr lang="en-US" sz="1200" u="none" strike="noStrike">
+                          <a:effectLst/>
+                        </a:rPr>
+                        <a:t>yhat</a:t>
+                      </a:r>
+                      <a:endParaRPr lang="en-US" sz="1200" b="0" i="0" u="none" strike="noStrike">
+                        <a:solidFill>
+                          <a:srgbClr val="000000"/>
+                        </a:solidFill>
+                        <a:effectLst/>
+                        <a:latin typeface="Calibri" panose="020F0502020204030204" pitchFamily="34" charset="0"/>
+                      </a:endParaRPr>
+                    </a:p>
+                  </a:txBody>
+                  <a:tcPr marL="9525" marR="9525" marT="9525" marB="0" anchor="b"/>
+                </a:tc>
+                <a:tc>
+                  <a:txBody>
+                    <a:bodyPr/>
+                    <a:lstStyle/>
+                    <a:p>
+                      <a:pPr algn="l" fontAlgn="b"/>
+                      <a:r>
+                        <a:rPr lang="en-US" sz="1200" u="none" strike="noStrike">
+                          <a:effectLst/>
+                        </a:rPr>
+                        <a:t>Actual</a:t>
+                      </a:r>
+                      <a:endParaRPr lang="en-US" sz="1200" b="0" i="0" u="none" strike="noStrike">
+                        <a:solidFill>
+                          <a:srgbClr val="000000"/>
+                        </a:solidFill>
+                        <a:effectLst/>
+                        <a:latin typeface="Calibri" panose="020F0502020204030204" pitchFamily="34" charset="0"/>
+                      </a:endParaRPr>
+                    </a:p>
+                  </a:txBody>
+                  <a:tcPr marL="9525" marR="9525" marT="9525" marB="0" anchor="b"/>
+                </a:tc>
+                <a:extLst>
+                  <a:ext uri="{0D108BD9-81ED-4DB2-BD59-A6C34878D82A}">
+                    <a16:rowId xmlns:a16="http://schemas.microsoft.com/office/drawing/2014/main" val="308208188"/>
+                  </a:ext>
+                </a:extLst>
+              </a:tr>
+              <a:tr h="203200">
+                <a:tc>
+                  <a:txBody>
+                    <a:bodyPr/>
+                    <a:lstStyle/>
+                    <a:p>
+                      <a:pPr algn="r" fontAlgn="b"/>
+                      <a:r>
+                        <a:rPr lang="en-US" sz="1200" u="none" strike="noStrike">
+                          <a:effectLst/>
+                        </a:rPr>
+                        <a:t>7/31/22</a:t>
+                      </a:r>
+                      <a:endParaRPr lang="en-US" sz="1200" b="0" i="0" u="none" strike="noStrike">
+                        <a:solidFill>
+                          <a:srgbClr val="000000"/>
+                        </a:solidFill>
+                        <a:effectLst/>
+                        <a:latin typeface="Helvetica Neue" panose="02000503000000020004" pitchFamily="2" charset="0"/>
+                      </a:endParaRPr>
+                    </a:p>
+                  </a:txBody>
+                  <a:tcPr marL="9525" marR="9525" marT="9525" marB="0" anchor="b"/>
+                </a:tc>
+                <a:tc>
+                  <a:txBody>
+                    <a:bodyPr/>
+                    <a:lstStyle/>
+                    <a:p>
+                      <a:pPr algn="l" fontAlgn="b"/>
+                      <a:r>
+                        <a:rPr lang="en-US" sz="1200" u="none" strike="noStrike">
+                          <a:effectLst/>
+                        </a:rPr>
+                        <a:t> $        455,655 </a:t>
+                      </a:r>
+                      <a:endParaRPr lang="en-US" sz="1200" b="0" i="0" u="none" strike="noStrike">
+                        <a:solidFill>
+                          <a:srgbClr val="000000"/>
+                        </a:solidFill>
+                        <a:effectLst/>
+                        <a:latin typeface="Helvetica Neue" panose="02000503000000020004" pitchFamily="2" charset="0"/>
+                      </a:endParaRPr>
+                    </a:p>
+                  </a:txBody>
+                  <a:tcPr marL="9525" marR="9525" marT="9525" marB="0" anchor="b"/>
+                </a:tc>
+                <a:tc>
+                  <a:txBody>
+                    <a:bodyPr/>
+                    <a:lstStyle/>
+                    <a:p>
+                      <a:pPr algn="l" fontAlgn="b"/>
+                      <a:r>
+                        <a:rPr lang="en-US" sz="1200" u="none" strike="noStrike">
+                          <a:effectLst/>
+                        </a:rPr>
+                        <a:t> $        454,460 </a:t>
+                      </a:r>
+                      <a:endParaRPr lang="en-US" sz="1200" b="0" i="0" u="none" strike="noStrike">
+                        <a:solidFill>
+                          <a:srgbClr val="000000"/>
+                        </a:solidFill>
+                        <a:effectLst/>
+                        <a:latin typeface="Helvetica Neue" panose="02000503000000020004" pitchFamily="2" charset="0"/>
+                      </a:endParaRPr>
+                    </a:p>
+                  </a:txBody>
+                  <a:tcPr marL="9525" marR="9525" marT="9525" marB="0" anchor="b"/>
+                </a:tc>
+                <a:tc>
+                  <a:txBody>
+                    <a:bodyPr/>
+                    <a:lstStyle/>
+                    <a:p>
+                      <a:pPr algn="l" fontAlgn="b"/>
+                      <a:r>
+                        <a:rPr lang="en-US" sz="1200" u="none" strike="noStrike">
+                          <a:effectLst/>
+                        </a:rPr>
+                        <a:t> $        455,288 </a:t>
+                      </a:r>
+                      <a:endParaRPr lang="en-US" sz="1200" b="0" i="0" u="none" strike="noStrike">
+                        <a:solidFill>
+                          <a:srgbClr val="000000"/>
+                        </a:solidFill>
+                        <a:effectLst/>
+                        <a:latin typeface="Helvetica Neue" panose="02000503000000020004" pitchFamily="2" charset="0"/>
+                      </a:endParaRPr>
+                    </a:p>
+                  </a:txBody>
+                  <a:tcPr marL="9525" marR="9525" marT="9525" marB="0" anchor="b"/>
+                </a:tc>
+                <a:extLst>
+                  <a:ext uri="{0D108BD9-81ED-4DB2-BD59-A6C34878D82A}">
+                    <a16:rowId xmlns:a16="http://schemas.microsoft.com/office/drawing/2014/main" val="696089795"/>
+                  </a:ext>
+                </a:extLst>
+              </a:tr>
+              <a:tr h="203200">
+                <a:tc>
+                  <a:txBody>
+                    <a:bodyPr/>
+                    <a:lstStyle/>
+                    <a:p>
+                      <a:pPr algn="r" fontAlgn="b"/>
+                      <a:r>
+                        <a:rPr lang="en-US" sz="1200" u="none" strike="noStrike">
+                          <a:effectLst/>
+                        </a:rPr>
+                        <a:t>8/31/22</a:t>
+                      </a:r>
+                      <a:endParaRPr lang="en-US" sz="1200" b="0" i="0" u="none" strike="noStrike">
+                        <a:solidFill>
+                          <a:srgbClr val="000000"/>
+                        </a:solidFill>
+                        <a:effectLst/>
+                        <a:latin typeface="Helvetica Neue" panose="02000503000000020004" pitchFamily="2" charset="0"/>
+                      </a:endParaRPr>
+                    </a:p>
+                  </a:txBody>
+                  <a:tcPr marL="9525" marR="9525" marT="9525" marB="0" anchor="b"/>
+                </a:tc>
+                <a:tc>
+                  <a:txBody>
+                    <a:bodyPr/>
+                    <a:lstStyle/>
+                    <a:p>
+                      <a:pPr algn="l" fontAlgn="b"/>
+                      <a:r>
+                        <a:rPr lang="en-US" sz="1200" u="none" strike="noStrike">
+                          <a:effectLst/>
+                        </a:rPr>
+                        <a:t> $        460,011 </a:t>
+                      </a:r>
+                      <a:endParaRPr lang="en-US" sz="1200" b="0" i="0" u="none" strike="noStrike">
+                        <a:solidFill>
+                          <a:srgbClr val="000000"/>
+                        </a:solidFill>
+                        <a:effectLst/>
+                        <a:latin typeface="Helvetica Neue" panose="02000503000000020004" pitchFamily="2" charset="0"/>
+                      </a:endParaRPr>
+                    </a:p>
+                  </a:txBody>
+                  <a:tcPr marL="9525" marR="9525" marT="9525" marB="0" anchor="b"/>
+                </a:tc>
+                <a:tc>
+                  <a:txBody>
+                    <a:bodyPr/>
+                    <a:lstStyle/>
+                    <a:p>
+                      <a:pPr algn="l" fontAlgn="b"/>
+                      <a:r>
+                        <a:rPr lang="en-US" sz="1200" u="none" strike="noStrike">
+                          <a:effectLst/>
+                        </a:rPr>
+                        <a:t> $        456,911 </a:t>
+                      </a:r>
+                      <a:endParaRPr lang="en-US" sz="1200" b="0" i="0" u="none" strike="noStrike">
+                        <a:solidFill>
+                          <a:srgbClr val="000000"/>
+                        </a:solidFill>
+                        <a:effectLst/>
+                        <a:latin typeface="Helvetica Neue" panose="02000503000000020004" pitchFamily="2" charset="0"/>
+                      </a:endParaRPr>
+                    </a:p>
+                  </a:txBody>
+                  <a:tcPr marL="9525" marR="9525" marT="9525" marB="0" anchor="b"/>
+                </a:tc>
+                <a:tc>
+                  <a:txBody>
+                    <a:bodyPr/>
+                    <a:lstStyle/>
+                    <a:p>
+                      <a:pPr algn="l" fontAlgn="b"/>
+                      <a:r>
+                        <a:rPr lang="en-US" sz="1200" u="none" strike="noStrike">
+                          <a:effectLst/>
+                        </a:rPr>
+                        <a:t> $        455,381 </a:t>
+                      </a:r>
+                      <a:endParaRPr lang="en-US" sz="1200" b="0" i="0" u="none" strike="noStrike">
+                        <a:solidFill>
+                          <a:srgbClr val="000000"/>
+                        </a:solidFill>
+                        <a:effectLst/>
+                        <a:latin typeface="Helvetica Neue" panose="02000503000000020004" pitchFamily="2" charset="0"/>
+                      </a:endParaRPr>
+                    </a:p>
+                  </a:txBody>
+                  <a:tcPr marL="9525" marR="9525" marT="9525" marB="0" anchor="b"/>
+                </a:tc>
+                <a:extLst>
+                  <a:ext uri="{0D108BD9-81ED-4DB2-BD59-A6C34878D82A}">
+                    <a16:rowId xmlns:a16="http://schemas.microsoft.com/office/drawing/2014/main" val="1637125041"/>
+                  </a:ext>
+                </a:extLst>
+              </a:tr>
+              <a:tr h="203200">
+                <a:tc>
+                  <a:txBody>
+                    <a:bodyPr/>
+                    <a:lstStyle/>
+                    <a:p>
+                      <a:pPr algn="r" fontAlgn="b"/>
+                      <a:r>
+                        <a:rPr lang="en-US" sz="1200" u="none" strike="noStrike">
+                          <a:effectLst/>
+                        </a:rPr>
+                        <a:t>9/30/22</a:t>
+                      </a:r>
+                      <a:endParaRPr lang="en-US" sz="1200" b="0" i="0" u="none" strike="noStrike">
+                        <a:solidFill>
+                          <a:srgbClr val="000000"/>
+                        </a:solidFill>
+                        <a:effectLst/>
+                        <a:latin typeface="Helvetica Neue" panose="02000503000000020004" pitchFamily="2" charset="0"/>
+                      </a:endParaRPr>
+                    </a:p>
+                  </a:txBody>
+                  <a:tcPr marL="9525" marR="9525" marT="9525" marB="0" anchor="b"/>
+                </a:tc>
+                <a:tc>
+                  <a:txBody>
+                    <a:bodyPr/>
+                    <a:lstStyle/>
+                    <a:p>
+                      <a:pPr algn="l" fontAlgn="b"/>
+                      <a:r>
+                        <a:rPr lang="en-US" sz="1200" u="none" strike="noStrike">
+                          <a:effectLst/>
+                        </a:rPr>
+                        <a:t> $        464,367 </a:t>
+                      </a:r>
+                      <a:endParaRPr lang="en-US" sz="1200" b="0" i="0" u="none" strike="noStrike">
+                        <a:solidFill>
+                          <a:srgbClr val="000000"/>
+                        </a:solidFill>
+                        <a:effectLst/>
+                        <a:latin typeface="Helvetica Neue" panose="02000503000000020004" pitchFamily="2" charset="0"/>
+                      </a:endParaRPr>
+                    </a:p>
+                  </a:txBody>
+                  <a:tcPr marL="9525" marR="9525" marT="9525" marB="0" anchor="b"/>
+                </a:tc>
+                <a:tc>
+                  <a:txBody>
+                    <a:bodyPr/>
+                    <a:lstStyle/>
+                    <a:p>
+                      <a:pPr algn="l" fontAlgn="b"/>
+                      <a:r>
+                        <a:rPr lang="en-US" sz="1200" u="none" strike="noStrike">
+                          <a:effectLst/>
+                        </a:rPr>
+                        <a:t> $        461,092 </a:t>
+                      </a:r>
+                      <a:endParaRPr lang="en-US" sz="1200" b="0" i="0" u="none" strike="noStrike">
+                        <a:solidFill>
+                          <a:srgbClr val="000000"/>
+                        </a:solidFill>
+                        <a:effectLst/>
+                        <a:latin typeface="Helvetica Neue" panose="02000503000000020004" pitchFamily="2" charset="0"/>
+                      </a:endParaRPr>
+                    </a:p>
+                  </a:txBody>
+                  <a:tcPr marL="9525" marR="9525" marT="9525" marB="0" anchor="b"/>
+                </a:tc>
+                <a:tc>
+                  <a:txBody>
+                    <a:bodyPr/>
+                    <a:lstStyle/>
+                    <a:p>
+                      <a:pPr algn="l" fontAlgn="b"/>
+                      <a:r>
+                        <a:rPr lang="en-US" sz="1200" u="none" strike="noStrike">
+                          <a:effectLst/>
+                        </a:rPr>
+                        <a:t> $        454,396 </a:t>
+                      </a:r>
+                      <a:endParaRPr lang="en-US" sz="1200" b="0" i="0" u="none" strike="noStrike">
+                        <a:solidFill>
+                          <a:srgbClr val="000000"/>
+                        </a:solidFill>
+                        <a:effectLst/>
+                        <a:latin typeface="Helvetica Neue" panose="02000503000000020004" pitchFamily="2" charset="0"/>
+                      </a:endParaRPr>
+                    </a:p>
+                  </a:txBody>
+                  <a:tcPr marL="9525" marR="9525" marT="9525" marB="0" anchor="b"/>
+                </a:tc>
+                <a:extLst>
+                  <a:ext uri="{0D108BD9-81ED-4DB2-BD59-A6C34878D82A}">
+                    <a16:rowId xmlns:a16="http://schemas.microsoft.com/office/drawing/2014/main" val="104193018"/>
+                  </a:ext>
+                </a:extLst>
+              </a:tr>
+              <a:tr h="203200">
+                <a:tc>
+                  <a:txBody>
+                    <a:bodyPr/>
+                    <a:lstStyle/>
+                    <a:p>
+                      <a:pPr algn="r" fontAlgn="b"/>
+                      <a:r>
+                        <a:rPr lang="en-US" sz="1200" u="none" strike="noStrike">
+                          <a:effectLst/>
+                        </a:rPr>
+                        <a:t>10/31/22</a:t>
+                      </a:r>
+                      <a:endParaRPr lang="en-US" sz="1200" b="0" i="0" u="none" strike="noStrike">
+                        <a:solidFill>
+                          <a:srgbClr val="000000"/>
+                        </a:solidFill>
+                        <a:effectLst/>
+                        <a:latin typeface="Helvetica Neue" panose="02000503000000020004" pitchFamily="2" charset="0"/>
+                      </a:endParaRPr>
+                    </a:p>
+                  </a:txBody>
+                  <a:tcPr marL="9525" marR="9525" marT="9525" marB="0" anchor="b"/>
+                </a:tc>
+                <a:tc>
+                  <a:txBody>
+                    <a:bodyPr/>
+                    <a:lstStyle/>
+                    <a:p>
+                      <a:pPr algn="l" fontAlgn="b"/>
+                      <a:r>
+                        <a:rPr lang="en-US" sz="1200" u="none" strike="noStrike">
+                          <a:effectLst/>
+                        </a:rPr>
+                        <a:t> $        468,724 </a:t>
+                      </a:r>
+                      <a:endParaRPr lang="en-US" sz="1200" b="0" i="0" u="none" strike="noStrike">
+                        <a:solidFill>
+                          <a:srgbClr val="000000"/>
+                        </a:solidFill>
+                        <a:effectLst/>
+                        <a:latin typeface="Helvetica Neue" panose="02000503000000020004" pitchFamily="2" charset="0"/>
+                      </a:endParaRPr>
+                    </a:p>
+                  </a:txBody>
+                  <a:tcPr marL="9525" marR="9525" marT="9525" marB="0" anchor="b"/>
+                </a:tc>
+                <a:tc>
+                  <a:txBody>
+                    <a:bodyPr/>
+                    <a:lstStyle/>
+                    <a:p>
+                      <a:pPr algn="l" fontAlgn="b"/>
+                      <a:r>
+                        <a:rPr lang="en-US" sz="1200" u="none" strike="noStrike">
+                          <a:effectLst/>
+                        </a:rPr>
+                        <a:t> $        466,705 </a:t>
+                      </a:r>
+                      <a:endParaRPr lang="en-US" sz="1200" b="0" i="0" u="none" strike="noStrike">
+                        <a:solidFill>
+                          <a:srgbClr val="000000"/>
+                        </a:solidFill>
+                        <a:effectLst/>
+                        <a:latin typeface="Helvetica Neue" panose="02000503000000020004" pitchFamily="2" charset="0"/>
+                      </a:endParaRPr>
+                    </a:p>
+                  </a:txBody>
+                  <a:tcPr marL="9525" marR="9525" marT="9525" marB="0" anchor="b"/>
+                </a:tc>
+                <a:tc>
+                  <a:txBody>
+                    <a:bodyPr/>
+                    <a:lstStyle/>
+                    <a:p>
+                      <a:pPr algn="l" fontAlgn="b"/>
+                      <a:r>
+                        <a:rPr lang="en-US" sz="1200" u="none" strike="noStrike">
+                          <a:effectLst/>
+                        </a:rPr>
+                        <a:t> $        452,787 </a:t>
+                      </a:r>
+                      <a:endParaRPr lang="en-US" sz="1200" b="0" i="0" u="none" strike="noStrike">
+                        <a:solidFill>
+                          <a:srgbClr val="000000"/>
+                        </a:solidFill>
+                        <a:effectLst/>
+                        <a:latin typeface="Helvetica Neue" panose="02000503000000020004" pitchFamily="2" charset="0"/>
+                      </a:endParaRPr>
+                    </a:p>
+                  </a:txBody>
+                  <a:tcPr marL="9525" marR="9525" marT="9525" marB="0" anchor="b"/>
+                </a:tc>
+                <a:extLst>
+                  <a:ext uri="{0D108BD9-81ED-4DB2-BD59-A6C34878D82A}">
+                    <a16:rowId xmlns:a16="http://schemas.microsoft.com/office/drawing/2014/main" val="3595207904"/>
+                  </a:ext>
+                </a:extLst>
+              </a:tr>
+              <a:tr h="203200">
+                <a:tc>
+                  <a:txBody>
+                    <a:bodyPr/>
+                    <a:lstStyle/>
+                    <a:p>
+                      <a:pPr algn="r" fontAlgn="b"/>
+                      <a:r>
+                        <a:rPr lang="en-US" sz="1200" u="none" strike="noStrike">
+                          <a:effectLst/>
+                        </a:rPr>
+                        <a:t>11/30/22</a:t>
+                      </a:r>
+                      <a:endParaRPr lang="en-US" sz="1200" b="0" i="0" u="none" strike="noStrike">
+                        <a:solidFill>
+                          <a:srgbClr val="000000"/>
+                        </a:solidFill>
+                        <a:effectLst/>
+                        <a:latin typeface="Helvetica Neue" panose="02000503000000020004" pitchFamily="2" charset="0"/>
+                      </a:endParaRPr>
+                    </a:p>
+                  </a:txBody>
+                  <a:tcPr marL="9525" marR="9525" marT="9525" marB="0" anchor="b"/>
+                </a:tc>
+                <a:tc>
+                  <a:txBody>
+                    <a:bodyPr/>
+                    <a:lstStyle/>
+                    <a:p>
+                      <a:pPr algn="l" fontAlgn="b"/>
+                      <a:r>
+                        <a:rPr lang="en-US" sz="1200" u="none" strike="noStrike">
+                          <a:effectLst/>
+                        </a:rPr>
+                        <a:t> $        472,939 </a:t>
+                      </a:r>
+                      <a:endParaRPr lang="en-US" sz="1200" b="0" i="0" u="none" strike="noStrike">
+                        <a:solidFill>
+                          <a:srgbClr val="000000"/>
+                        </a:solidFill>
+                        <a:effectLst/>
+                        <a:latin typeface="Helvetica Neue" panose="02000503000000020004" pitchFamily="2" charset="0"/>
+                      </a:endParaRPr>
+                    </a:p>
+                  </a:txBody>
+                  <a:tcPr marL="9525" marR="9525" marT="9525" marB="0" anchor="b"/>
+                </a:tc>
+                <a:tc>
+                  <a:txBody>
+                    <a:bodyPr/>
+                    <a:lstStyle/>
+                    <a:p>
+                      <a:pPr algn="l" fontAlgn="b"/>
+                      <a:r>
+                        <a:rPr lang="en-US" sz="1200" u="none" strike="noStrike">
+                          <a:effectLst/>
+                        </a:rPr>
+                        <a:t> $        473,797 </a:t>
+                      </a:r>
+                      <a:endParaRPr lang="en-US" sz="1200" b="0" i="0" u="none" strike="noStrike">
+                        <a:solidFill>
+                          <a:srgbClr val="000000"/>
+                        </a:solidFill>
+                        <a:effectLst/>
+                        <a:latin typeface="Helvetica Neue" panose="02000503000000020004" pitchFamily="2" charset="0"/>
+                      </a:endParaRPr>
+                    </a:p>
+                  </a:txBody>
+                  <a:tcPr marL="9525" marR="9525" marT="9525" marB="0" anchor="b"/>
+                </a:tc>
+                <a:tc>
+                  <a:txBody>
+                    <a:bodyPr/>
+                    <a:lstStyle/>
+                    <a:p>
+                      <a:pPr algn="l" fontAlgn="b"/>
+                      <a:r>
+                        <a:rPr lang="en-US" sz="1200" u="none" strike="noStrike">
+                          <a:effectLst/>
+                        </a:rPr>
+                        <a:t> $        451,908 </a:t>
+                      </a:r>
+                      <a:endParaRPr lang="en-US" sz="1200" b="0" i="0" u="none" strike="noStrike">
+                        <a:solidFill>
+                          <a:srgbClr val="000000"/>
+                        </a:solidFill>
+                        <a:effectLst/>
+                        <a:latin typeface="Helvetica Neue" panose="02000503000000020004" pitchFamily="2" charset="0"/>
+                      </a:endParaRPr>
+                    </a:p>
+                  </a:txBody>
+                  <a:tcPr marL="9525" marR="9525" marT="9525" marB="0" anchor="b"/>
+                </a:tc>
+                <a:extLst>
+                  <a:ext uri="{0D108BD9-81ED-4DB2-BD59-A6C34878D82A}">
+                    <a16:rowId xmlns:a16="http://schemas.microsoft.com/office/drawing/2014/main" val="3544164122"/>
+                  </a:ext>
+                </a:extLst>
+              </a:tr>
+              <a:tr h="203200">
+                <a:tc>
+                  <a:txBody>
+                    <a:bodyPr/>
+                    <a:lstStyle/>
+                    <a:p>
+                      <a:pPr algn="r" fontAlgn="b"/>
+                      <a:r>
+                        <a:rPr lang="en-US" sz="1200" u="none" strike="noStrike">
+                          <a:effectLst/>
+                        </a:rPr>
+                        <a:t>12/31/22</a:t>
+                      </a:r>
+                      <a:endParaRPr lang="en-US" sz="1200" b="0" i="0" u="none" strike="noStrike">
+                        <a:solidFill>
+                          <a:srgbClr val="000000"/>
+                        </a:solidFill>
+                        <a:effectLst/>
+                        <a:latin typeface="Helvetica Neue" panose="02000503000000020004" pitchFamily="2" charset="0"/>
+                      </a:endParaRPr>
+                    </a:p>
+                  </a:txBody>
+                  <a:tcPr marL="9525" marR="9525" marT="9525" marB="0" anchor="b"/>
+                </a:tc>
+                <a:tc>
+                  <a:txBody>
+                    <a:bodyPr/>
+                    <a:lstStyle/>
+                    <a:p>
+                      <a:pPr algn="l" fontAlgn="b"/>
+                      <a:r>
+                        <a:rPr lang="en-US" sz="1200" u="none" strike="noStrike">
+                          <a:effectLst/>
+                        </a:rPr>
+                        <a:t> $        477,295 </a:t>
+                      </a:r>
+                      <a:endParaRPr lang="en-US" sz="1200" b="0" i="0" u="none" strike="noStrike">
+                        <a:solidFill>
+                          <a:srgbClr val="000000"/>
+                        </a:solidFill>
+                        <a:effectLst/>
+                        <a:latin typeface="Helvetica Neue" panose="02000503000000020004" pitchFamily="2" charset="0"/>
+                      </a:endParaRPr>
+                    </a:p>
+                  </a:txBody>
+                  <a:tcPr marL="9525" marR="9525" marT="9525" marB="0" anchor="b"/>
+                </a:tc>
+                <a:tc>
+                  <a:txBody>
+                    <a:bodyPr/>
+                    <a:lstStyle/>
+                    <a:p>
+                      <a:pPr algn="l" fontAlgn="b"/>
+                      <a:r>
+                        <a:rPr lang="en-US" sz="1200" u="none" strike="noStrike">
+                          <a:effectLst/>
+                        </a:rPr>
+                        <a:t> $        479,652 </a:t>
+                      </a:r>
+                      <a:endParaRPr lang="en-US" sz="1200" b="0" i="0" u="none" strike="noStrike">
+                        <a:solidFill>
+                          <a:srgbClr val="000000"/>
+                        </a:solidFill>
+                        <a:effectLst/>
+                        <a:latin typeface="Helvetica Neue" panose="02000503000000020004" pitchFamily="2" charset="0"/>
+                      </a:endParaRPr>
+                    </a:p>
+                  </a:txBody>
+                  <a:tcPr marL="9525" marR="9525" marT="9525" marB="0" anchor="b"/>
+                </a:tc>
+                <a:tc>
+                  <a:txBody>
+                    <a:bodyPr/>
+                    <a:lstStyle/>
+                    <a:p>
+                      <a:pPr algn="l" fontAlgn="b"/>
+                      <a:r>
+                        <a:rPr lang="en-US" sz="1200" u="none" strike="noStrike">
+                          <a:effectLst/>
+                        </a:rPr>
+                        <a:t> $        451,690 </a:t>
+                      </a:r>
+                      <a:endParaRPr lang="en-US" sz="1200" b="0" i="0" u="none" strike="noStrike">
+                        <a:solidFill>
+                          <a:srgbClr val="000000"/>
+                        </a:solidFill>
+                        <a:effectLst/>
+                        <a:latin typeface="Helvetica Neue" panose="02000503000000020004" pitchFamily="2" charset="0"/>
+                      </a:endParaRPr>
+                    </a:p>
+                  </a:txBody>
+                  <a:tcPr marL="9525" marR="9525" marT="9525" marB="0" anchor="b"/>
+                </a:tc>
+                <a:extLst>
+                  <a:ext uri="{0D108BD9-81ED-4DB2-BD59-A6C34878D82A}">
+                    <a16:rowId xmlns:a16="http://schemas.microsoft.com/office/drawing/2014/main" val="390671389"/>
+                  </a:ext>
+                </a:extLst>
+              </a:tr>
+              <a:tr h="203200">
+                <a:tc>
+                  <a:txBody>
+                    <a:bodyPr/>
+                    <a:lstStyle/>
+                    <a:p>
+                      <a:pPr algn="r" fontAlgn="b"/>
+                      <a:r>
+                        <a:rPr lang="en-US" sz="1200" u="none" strike="noStrike">
+                          <a:effectLst/>
+                        </a:rPr>
+                        <a:t>1/31/23</a:t>
+                      </a:r>
+                      <a:endParaRPr lang="en-US" sz="1200" b="0" i="0" u="none" strike="noStrike">
+                        <a:solidFill>
+                          <a:srgbClr val="000000"/>
+                        </a:solidFill>
+                        <a:effectLst/>
+                        <a:latin typeface="Helvetica Neue" panose="02000503000000020004" pitchFamily="2" charset="0"/>
+                      </a:endParaRPr>
+                    </a:p>
+                  </a:txBody>
+                  <a:tcPr marL="9525" marR="9525" marT="9525" marB="0" anchor="b"/>
+                </a:tc>
+                <a:tc>
+                  <a:txBody>
+                    <a:bodyPr/>
+                    <a:lstStyle/>
+                    <a:p>
+                      <a:pPr algn="l" fontAlgn="b"/>
+                      <a:r>
+                        <a:rPr lang="en-US" sz="1200" u="none" strike="noStrike">
+                          <a:effectLst/>
+                        </a:rPr>
+                        <a:t> $        481,652 </a:t>
+                      </a:r>
+                      <a:endParaRPr lang="en-US" sz="1200" b="0" i="0" u="none" strike="noStrike">
+                        <a:solidFill>
+                          <a:srgbClr val="000000"/>
+                        </a:solidFill>
+                        <a:effectLst/>
+                        <a:latin typeface="Helvetica Neue" panose="02000503000000020004" pitchFamily="2" charset="0"/>
+                      </a:endParaRPr>
+                    </a:p>
+                  </a:txBody>
+                  <a:tcPr marL="9525" marR="9525" marT="9525" marB="0" anchor="b"/>
+                </a:tc>
+                <a:tc>
+                  <a:txBody>
+                    <a:bodyPr/>
+                    <a:lstStyle/>
+                    <a:p>
+                      <a:pPr algn="l" fontAlgn="b"/>
+                      <a:r>
+                        <a:rPr lang="en-US" sz="1200" u="none" strike="noStrike">
+                          <a:effectLst/>
+                        </a:rPr>
+                        <a:t> $        480,567 </a:t>
+                      </a:r>
+                      <a:endParaRPr lang="en-US" sz="1200" b="0" i="0" u="none" strike="noStrike">
+                        <a:solidFill>
+                          <a:srgbClr val="000000"/>
+                        </a:solidFill>
+                        <a:effectLst/>
+                        <a:latin typeface="Helvetica Neue" panose="02000503000000020004" pitchFamily="2" charset="0"/>
+                      </a:endParaRPr>
+                    </a:p>
+                  </a:txBody>
+                  <a:tcPr marL="9525" marR="9525" marT="9525" marB="0" anchor="b"/>
+                </a:tc>
+                <a:tc>
+                  <a:txBody>
+                    <a:bodyPr/>
+                    <a:lstStyle/>
+                    <a:p>
+                      <a:pPr algn="l" fontAlgn="b"/>
+                      <a:r>
+                        <a:rPr lang="en-US" sz="1200" u="none" strike="noStrike" dirty="0">
+                          <a:effectLst/>
+                        </a:rPr>
+                        <a:t> $        459,199 </a:t>
+                      </a:r>
+                      <a:endParaRPr lang="en-US" sz="1200" b="0" i="0" u="none" strike="noStrike" dirty="0">
+                        <a:solidFill>
+                          <a:srgbClr val="000000"/>
+                        </a:solidFill>
+                        <a:effectLst/>
+                        <a:latin typeface="Helvetica Neue" panose="02000503000000020004" pitchFamily="2" charset="0"/>
+                      </a:endParaRPr>
+                    </a:p>
+                  </a:txBody>
+                  <a:tcPr marL="9525" marR="9525" marT="9525" marB="0" anchor="b"/>
+                </a:tc>
+                <a:extLst>
+                  <a:ext uri="{0D108BD9-81ED-4DB2-BD59-A6C34878D82A}">
+                    <a16:rowId xmlns:a16="http://schemas.microsoft.com/office/drawing/2014/main" val="780238234"/>
+                  </a:ext>
+                </a:extLst>
+              </a:tr>
+            </a:tbl>
+          </a:graphicData>
+        </a:graphic>
+      </p:graphicFrame>
+    </p:spTree>
+    <p:extLst>
+      <p:ext uri="{BB962C8B-B14F-4D97-AF65-F5344CB8AC3E}">
+        <p14:creationId xmlns:p14="http://schemas.microsoft.com/office/powerpoint/2010/main" val="2736716904"/>
+      </p:ext>
+    </p:extLst>
+  </p:cSld>
+  <p:clrMapOvr>
+    <a:masterClrMapping/>
+  </p:clrMapOvr>
+</p:sld>
+</file>
+
+<file path=ppt/slides/slide22.xml><?xml version="1.0" encoding="utf-8"?>
+<p:sld xmlns:a="http://schemas.openxmlformats.org/drawingml/2006/main" xmlns:r="http://schemas.openxmlformats.org/officeDocument/2006/relationships" xmlns:p="http://schemas.openxmlformats.org/presentationml/2006/main">
+  <p:cSld>
+    <p:spTree>
+      <p:nvGrpSpPr>
+        <p:cNvPr id="1" name=""/>
+        <p:cNvGrpSpPr/>
+        <p:nvPr/>
+      </p:nvGrpSpPr>
+      <p:grpSpPr>
+        <a:xfrm>
+          <a:off x="0" y="0"/>
+          <a:ext cx="0" cy="0"/>
+          <a:chOff x="0" y="0"/>
+          <a:chExt cx="0" cy="0"/>
+        </a:xfrm>
+      </p:grpSpPr>
+      <p:sp>
+        <p:nvSpPr>
+          <p:cNvPr id="2" name="Title 1">
+            <a:extLst>
+              <a:ext uri="{FF2B5EF4-FFF2-40B4-BE49-F238E27FC236}">
+                <a16:creationId xmlns:a16="http://schemas.microsoft.com/office/drawing/2014/main" id="{673E30C4-8B06-B4EA-30A7-CEA53EBB5BF5}"/>
+              </a:ext>
+            </a:extLst>
+          </p:cNvPr>
+          <p:cNvSpPr>
+            <a:spLocks noGrp="1"/>
+          </p:cNvSpPr>
+          <p:nvPr>
+            <p:ph type="title"/>
+          </p:nvPr>
+        </p:nvSpPr>
+        <p:spPr/>
+        <p:txBody>
+          <a:bodyPr/>
+          <a:lstStyle/>
+          <a:p>
+            <a:endParaRPr lang="en-US"/>
+          </a:p>
+        </p:txBody>
+      </p:sp>
+      <p:sp>
+        <p:nvSpPr>
+          <p:cNvPr id="3" name="Text Placeholder 2">
+            <a:extLst>
+              <a:ext uri="{FF2B5EF4-FFF2-40B4-BE49-F238E27FC236}">
+                <a16:creationId xmlns:a16="http://schemas.microsoft.com/office/drawing/2014/main" id="{B6FF059B-FC6D-DCAD-8277-FB2ABBAA6128}"/>
+              </a:ext>
+            </a:extLst>
+          </p:cNvPr>
+          <p:cNvSpPr>
+            <a:spLocks noGrp="1"/>
+          </p:cNvSpPr>
+          <p:nvPr>
+            <p:ph type="body" idx="1"/>
+          </p:nvPr>
+        </p:nvSpPr>
+        <p:spPr/>
+        <p:txBody>
+          <a:bodyPr/>
+          <a:lstStyle/>
+          <a:p>
+            <a:endParaRPr lang="en-US" dirty="0"/>
+          </a:p>
+        </p:txBody>
+      </p:sp>
+      <p:pic>
+        <p:nvPicPr>
+          <p:cNvPr id="4098" name="Picture 2">
+            <a:extLst>
+              <a:ext uri="{FF2B5EF4-FFF2-40B4-BE49-F238E27FC236}">
+                <a16:creationId xmlns:a16="http://schemas.microsoft.com/office/drawing/2014/main" id="{B4CDFC9D-DA88-5DD1-EDAC-928EE27D202C}"/>
+              </a:ext>
+            </a:extLst>
+          </p:cNvPr>
+          <p:cNvPicPr>
+            <a:picLocks noChangeAspect="1" noChangeArrowheads="1"/>
+          </p:cNvPicPr>
+          <p:nvPr/>
+        </p:nvPicPr>
+        <p:blipFill>
+          <a:blip r:embed="rId2">
+            <a:extLst>
+              <a:ext uri="{28A0092B-C50C-407E-A947-70E740481C1C}">
+                <a14:useLocalDpi xmlns:a14="http://schemas.microsoft.com/office/drawing/2010/main" val="0"/>
+              </a:ext>
+            </a:extLst>
+          </a:blip>
+          <a:srcRect/>
+          <a:stretch>
+            <a:fillRect/>
+          </a:stretch>
+        </p:blipFill>
+        <p:spPr bwMode="auto">
+          <a:xfrm>
+            <a:off x="576776" y="692150"/>
+            <a:ext cx="9080500" cy="5473700"/>
+          </a:xfrm>
+          <a:prstGeom prst="rect">
+            <a:avLst/>
+          </a:prstGeom>
+          <a:noFill/>
+          <a:extLst>
+            <a:ext uri="{909E8E84-426E-40DD-AFC4-6F175D3DCCD1}">
+              <a14:hiddenFill xmlns:a14="http://schemas.microsoft.com/office/drawing/2010/main">
+                <a:solidFill>
+                  <a:srgbClr val="FFFFFF"/>
+                </a:solidFill>
+              </a14:hiddenFill>
+            </a:ext>
+          </a:extLst>
+        </p:spPr>
+      </p:pic>
+      <p:pic>
+        <p:nvPicPr>
+          <p:cNvPr id="4100" name="Picture 4">
+            <a:extLst>
+              <a:ext uri="{FF2B5EF4-FFF2-40B4-BE49-F238E27FC236}">
+                <a16:creationId xmlns:a16="http://schemas.microsoft.com/office/drawing/2014/main" id="{D5FFACD1-C388-2810-4F6E-7A3298342173}"/>
+              </a:ext>
+            </a:extLst>
+          </p:cNvPr>
+          <p:cNvPicPr>
+            <a:picLocks noChangeAspect="1" noChangeArrowheads="1"/>
+          </p:cNvPicPr>
+          <p:nvPr/>
+        </p:nvPicPr>
+        <p:blipFill>
+          <a:blip r:embed="rId3">
+            <a:extLst>
+              <a:ext uri="{28A0092B-C50C-407E-A947-70E740481C1C}">
+                <a14:useLocalDpi xmlns:a14="http://schemas.microsoft.com/office/drawing/2010/main" val="0"/>
+              </a:ext>
+            </a:extLst>
+          </a:blip>
+          <a:srcRect/>
+          <a:stretch>
+            <a:fillRect/>
+          </a:stretch>
+        </p:blipFill>
+        <p:spPr bwMode="auto">
+          <a:xfrm>
+            <a:off x="4994030" y="2347261"/>
+            <a:ext cx="7005711" cy="3720872"/>
+          </a:xfrm>
+          <a:prstGeom prst="rect">
+            <a:avLst/>
+          </a:prstGeom>
+          <a:noFill/>
+          <a:extLst>
+            <a:ext uri="{909E8E84-426E-40DD-AFC4-6F175D3DCCD1}">
+              <a14:hiddenFill xmlns:a14="http://schemas.microsoft.com/office/drawing/2010/main">
+                <a:solidFill>
+                  <a:srgbClr val="FFFFFF"/>
+                </a:solidFill>
+              </a14:hiddenFill>
+            </a:ext>
+          </a:extLst>
+        </p:spPr>
+      </p:pic>
+    </p:spTree>
+    <p:extLst>
+      <p:ext uri="{BB962C8B-B14F-4D97-AF65-F5344CB8AC3E}">
+        <p14:creationId xmlns:p14="http://schemas.microsoft.com/office/powerpoint/2010/main" val="1436552963"/>
+      </p:ext>
+    </p:extLst>
+  </p:cSld>
+  <p:clrMapOvr>
+    <a:masterClrMapping/>
+  </p:clrMapOvr>
+</p:sld>
+</file>
+
+<file path=ppt/slides/slide23.xml><?xml version="1.0" encoding="utf-8"?>
+<p:sld xmlns:a="http://schemas.openxmlformats.org/drawingml/2006/main" xmlns:r="http://schemas.openxmlformats.org/officeDocument/2006/relationships" xmlns:p="http://schemas.openxmlformats.org/presentationml/2006/main">
+  <p:cSld>
+    <p:spTree>
+      <p:nvGrpSpPr>
+        <p:cNvPr id="1" name="Shape 271"/>
+        <p:cNvGrpSpPr/>
+        <p:nvPr/>
+      </p:nvGrpSpPr>
+      <p:grpSpPr>
+        <a:xfrm>
+          <a:off x="0" y="0"/>
+          <a:ext cx="0" cy="0"/>
+          <a:chOff x="0" y="0"/>
+          <a:chExt cx="0" cy="0"/>
+        </a:xfrm>
+      </p:grpSpPr>
+      <p:sp>
+        <p:nvSpPr>
+          <p:cNvPr id="272" name="Google Shape;272;ga479f66027_0_1"/>
+          <p:cNvSpPr txBox="1">
+            <a:spLocks noGrp="1"/>
+          </p:cNvSpPr>
+          <p:nvPr>
+            <p:ph type="title"/>
+          </p:nvPr>
+        </p:nvSpPr>
+        <p:spPr>
+          <a:xfrm>
+            <a:off x="528544" y="315293"/>
+            <a:ext cx="10921040" cy="738296"/>
+          </a:xfrm>
+          <a:prstGeom prst="rect">
+            <a:avLst/>
+          </a:prstGeom>
+        </p:spPr>
+        <p:txBody>
+          <a:bodyPr spcFirstLastPara="1" wrap="square" lIns="91425" tIns="91425" rIns="91425" bIns="91425" anchor="t" anchorCtr="0">
+            <a:noAutofit/>
+          </a:bodyPr>
+          <a:lstStyle/>
+          <a:p>
+            <a:pPr marL="0" lvl="0" indent="0" algn="l" rtl="0">
+              <a:spcBef>
+                <a:spcPts val="0"/>
+              </a:spcBef>
+              <a:spcAft>
+                <a:spcPts val="0"/>
+              </a:spcAft>
+              <a:buNone/>
+            </a:pPr>
+            <a:r>
+              <a:rPr lang="en-US" dirty="0"/>
+              <a:t>DATA ANALYSIS (PROPHET MODEL PREDICTION)</a:t>
+            </a:r>
+          </a:p>
+        </p:txBody>
+      </p:sp>
+      <p:sp>
+        <p:nvSpPr>
+          <p:cNvPr id="275" name="Google Shape;275;ga479f66027_0_1"/>
+          <p:cNvSpPr txBox="1"/>
+          <p:nvPr/>
+        </p:nvSpPr>
+        <p:spPr>
+          <a:xfrm>
+            <a:off x="7210682" y="1998042"/>
+            <a:ext cx="1843954" cy="1967951"/>
+          </a:xfrm>
+          <a:prstGeom prst="rect">
+            <a:avLst/>
+          </a:prstGeom>
+          <a:noFill/>
+          <a:ln>
+            <a:noFill/>
+          </a:ln>
+        </p:spPr>
+        <p:txBody>
+          <a:bodyPr spcFirstLastPara="1" wrap="square" lIns="121900" tIns="121900" rIns="121900" bIns="121900" anchor="t" anchorCtr="0">
+            <a:noAutofit/>
+          </a:bodyPr>
+          <a:lstStyle/>
+          <a:p>
+            <a:pPr marL="0" lvl="0" indent="0" algn="ctr" rtl="0">
+              <a:lnSpc>
+                <a:spcPct val="115000"/>
+              </a:lnSpc>
+              <a:spcBef>
+                <a:spcPts val="0"/>
+              </a:spcBef>
+              <a:spcAft>
+                <a:spcPts val="0"/>
+              </a:spcAft>
+              <a:buNone/>
+            </a:pPr>
+            <a:r>
+              <a:rPr lang="en-US" sz="1500" b="1" dirty="0">
+                <a:solidFill>
+                  <a:srgbClr val="FFFFFF"/>
+                </a:solidFill>
+                <a:latin typeface="Roboto"/>
+                <a:ea typeface="Roboto"/>
+                <a:cs typeface="Roboto"/>
+                <a:sym typeface="Roboto"/>
+              </a:rPr>
+              <a:t>Vestibulum </a:t>
+            </a:r>
+            <a:endParaRPr sz="1100" dirty="0">
+              <a:solidFill>
+                <a:srgbClr val="FFFFFF"/>
+              </a:solidFill>
+            </a:endParaRPr>
+          </a:p>
+        </p:txBody>
+      </p:sp>
+      <p:sp>
+        <p:nvSpPr>
+          <p:cNvPr id="277" name="Google Shape;277;ga479f66027_0_1"/>
+          <p:cNvSpPr txBox="1"/>
+          <p:nvPr/>
+        </p:nvSpPr>
+        <p:spPr>
+          <a:xfrm>
+            <a:off x="720400" y="1759789"/>
+            <a:ext cx="3552464" cy="4277086"/>
+          </a:xfrm>
+          <a:prstGeom prst="rect">
+            <a:avLst/>
+          </a:prstGeom>
+          <a:noFill/>
+          <a:ln>
+            <a:noFill/>
+          </a:ln>
+        </p:spPr>
+        <p:txBody>
+          <a:bodyPr spcFirstLastPara="1" wrap="square" lIns="91425" tIns="91425" rIns="91425" bIns="91425" anchor="t" anchorCtr="0">
+            <a:noAutofit/>
+          </a:bodyPr>
+          <a:lstStyle/>
+          <a:p>
+            <a:pPr marL="0" lvl="0" indent="0" algn="l" rtl="0">
+              <a:spcBef>
+                <a:spcPts val="0"/>
+              </a:spcBef>
+              <a:spcAft>
+                <a:spcPts val="0"/>
+              </a:spcAft>
+              <a:buNone/>
+            </a:pPr>
+            <a:endParaRPr lang="en-US" sz="1500" dirty="0">
+              <a:latin typeface="Twentieth Century"/>
+              <a:ea typeface="Twentieth Century"/>
+              <a:cs typeface="Twentieth Century"/>
+              <a:sym typeface="Twentieth Century"/>
+            </a:endParaRPr>
+          </a:p>
+        </p:txBody>
+      </p:sp>
+      <p:sp>
+        <p:nvSpPr>
+          <p:cNvPr id="278" name="Google Shape;278;ga479f66027_0_1"/>
+          <p:cNvSpPr txBox="1"/>
+          <p:nvPr/>
+        </p:nvSpPr>
+        <p:spPr>
+          <a:xfrm>
+            <a:off x="5401075" y="2353793"/>
+            <a:ext cx="1948200" cy="906000"/>
+          </a:xfrm>
+          <a:prstGeom prst="rect">
+            <a:avLst/>
+          </a:prstGeom>
+          <a:noFill/>
+          <a:ln>
+            <a:noFill/>
+          </a:ln>
+        </p:spPr>
+        <p:txBody>
+          <a:bodyPr spcFirstLastPara="1" wrap="square" lIns="91425" tIns="91425" rIns="91425" bIns="91425" anchor="t" anchorCtr="0">
+            <a:noAutofit/>
+          </a:bodyPr>
+          <a:lstStyle/>
+          <a:p>
+            <a:pPr marL="0" lvl="0" indent="0" algn="l" rtl="0">
+              <a:lnSpc>
+                <a:spcPct val="115000"/>
+              </a:lnSpc>
+              <a:spcBef>
+                <a:spcPts val="0"/>
+              </a:spcBef>
+              <a:spcAft>
+                <a:spcPts val="0"/>
+              </a:spcAft>
+              <a:buNone/>
+            </a:pPr>
+            <a:endParaRPr sz="1500" dirty="0">
+              <a:latin typeface="Twentieth Century"/>
+              <a:ea typeface="Twentieth Century"/>
+              <a:cs typeface="Twentieth Century"/>
+              <a:sym typeface="Twentieth Century"/>
+            </a:endParaRPr>
+          </a:p>
+          <a:p>
+            <a:pPr marL="0" lvl="0" indent="0" algn="l" rtl="0">
+              <a:spcBef>
+                <a:spcPts val="0"/>
+              </a:spcBef>
+              <a:spcAft>
+                <a:spcPts val="0"/>
+              </a:spcAft>
+              <a:buNone/>
+            </a:pPr>
+            <a:endParaRPr sz="1500" dirty="0">
+              <a:latin typeface="Twentieth Century"/>
+              <a:ea typeface="Twentieth Century"/>
+              <a:cs typeface="Twentieth Century"/>
+              <a:sym typeface="Twentieth Century"/>
+            </a:endParaRPr>
+          </a:p>
+        </p:txBody>
+      </p:sp>
+      <p:sp>
+        <p:nvSpPr>
+          <p:cNvPr id="5" name="TextBox 4">
+            <a:extLst>
+              <a:ext uri="{FF2B5EF4-FFF2-40B4-BE49-F238E27FC236}">
+                <a16:creationId xmlns:a16="http://schemas.microsoft.com/office/drawing/2014/main" id="{27FDF9AA-DC09-C98F-4825-0E2769AC85F7}"/>
+              </a:ext>
+            </a:extLst>
+          </p:cNvPr>
+          <p:cNvSpPr txBox="1"/>
+          <p:nvPr/>
+        </p:nvSpPr>
+        <p:spPr>
+          <a:xfrm>
+            <a:off x="720400" y="1112372"/>
+            <a:ext cx="6219645" cy="369332"/>
+          </a:xfrm>
+          <a:prstGeom prst="rect">
+            <a:avLst/>
+          </a:prstGeom>
+          <a:noFill/>
+        </p:spPr>
+        <p:txBody>
+          <a:bodyPr wrap="square" rtlCol="0">
+            <a:spAutoFit/>
+          </a:bodyPr>
+          <a:lstStyle/>
+          <a:p>
+            <a:r>
+              <a:rPr lang="en-US" dirty="0"/>
+              <a:t>County: San Diego, City: San Diego, Neighborhood: Pacific Beach</a:t>
+            </a:r>
+          </a:p>
+        </p:txBody>
+      </p:sp>
+      <p:pic>
+        <p:nvPicPr>
+          <p:cNvPr id="3" name="Picture 2">
+            <a:extLst>
+              <a:ext uri="{FF2B5EF4-FFF2-40B4-BE49-F238E27FC236}">
+                <a16:creationId xmlns:a16="http://schemas.microsoft.com/office/drawing/2014/main" id="{3412F587-3B56-0D09-DAEA-FF6729FE3F6C}"/>
+              </a:ext>
+            </a:extLst>
+          </p:cNvPr>
+          <p:cNvPicPr>
+            <a:picLocks noChangeAspect="1"/>
+          </p:cNvPicPr>
+          <p:nvPr/>
+        </p:nvPicPr>
+        <p:blipFill>
+          <a:blip r:embed="rId3"/>
+          <a:stretch>
+            <a:fillRect/>
+          </a:stretch>
+        </p:blipFill>
+        <p:spPr>
+          <a:xfrm>
+            <a:off x="528544" y="1620637"/>
+            <a:ext cx="7026249" cy="4206605"/>
+          </a:xfrm>
+          <a:prstGeom prst="rect">
+            <a:avLst/>
+          </a:prstGeom>
+        </p:spPr>
+      </p:pic>
+    </p:spTree>
+    <p:extLst>
+      <p:ext uri="{BB962C8B-B14F-4D97-AF65-F5344CB8AC3E}">
+        <p14:creationId xmlns:p14="http://schemas.microsoft.com/office/powerpoint/2010/main" val="2753893554"/>
+      </p:ext>
+    </p:extLst>
+  </p:cSld>
+  <p:clrMapOvr>
+    <a:masterClrMapping/>
+  </p:clrMapOvr>
+</p:sld>
+</file>
+
+<file path=ppt/slides/slide24.xml><?xml version="1.0" encoding="utf-8"?>
+<p:sld xmlns:a="http://schemas.openxmlformats.org/drawingml/2006/main" xmlns:r="http://schemas.openxmlformats.org/officeDocument/2006/relationships" xmlns:p="http://schemas.openxmlformats.org/presentationml/2006/main">
+  <p:cSld>
+    <p:spTree>
+      <p:nvGrpSpPr>
+        <p:cNvPr id="1" name=""/>
+        <p:cNvGrpSpPr/>
+        <p:nvPr/>
+      </p:nvGrpSpPr>
+      <p:grpSpPr>
+        <a:xfrm>
+          <a:off x="0" y="0"/>
+          <a:ext cx="0" cy="0"/>
+          <a:chOff x="0" y="0"/>
+          <a:chExt cx="0" cy="0"/>
+        </a:xfrm>
+      </p:grpSpPr>
+      <p:sp>
+        <p:nvSpPr>
+          <p:cNvPr id="2" name="Title 1">
+            <a:extLst>
+              <a:ext uri="{FF2B5EF4-FFF2-40B4-BE49-F238E27FC236}">
+                <a16:creationId xmlns:a16="http://schemas.microsoft.com/office/drawing/2014/main" id="{9731C53D-7913-656D-4C77-07F76BFF611D}"/>
+              </a:ext>
+            </a:extLst>
+          </p:cNvPr>
+          <p:cNvSpPr>
+            <a:spLocks noGrp="1"/>
+          </p:cNvSpPr>
+          <p:nvPr>
+            <p:ph type="title"/>
+          </p:nvPr>
+        </p:nvSpPr>
+        <p:spPr/>
+        <p:txBody>
+          <a:bodyPr/>
+          <a:lstStyle/>
+          <a:p>
+            <a:endParaRPr lang="en-US"/>
+          </a:p>
+        </p:txBody>
+      </p:sp>
+      <p:sp>
+        <p:nvSpPr>
+          <p:cNvPr id="3" name="Text Placeholder 2">
+            <a:extLst>
+              <a:ext uri="{FF2B5EF4-FFF2-40B4-BE49-F238E27FC236}">
+                <a16:creationId xmlns:a16="http://schemas.microsoft.com/office/drawing/2014/main" id="{9E36470F-FE0A-E931-FE2B-7252814CFACE}"/>
+              </a:ext>
+            </a:extLst>
+          </p:cNvPr>
+          <p:cNvSpPr>
+            <a:spLocks noGrp="1"/>
+          </p:cNvSpPr>
+          <p:nvPr>
+            <p:ph type="body" idx="1"/>
+          </p:nvPr>
+        </p:nvSpPr>
+        <p:spPr/>
+        <p:txBody>
+          <a:bodyPr/>
+          <a:lstStyle/>
+          <a:p>
+            <a:endParaRPr lang="en-US"/>
+          </a:p>
+        </p:txBody>
+      </p:sp>
+    </p:spTree>
+    <p:extLst>
+      <p:ext uri="{BB962C8B-B14F-4D97-AF65-F5344CB8AC3E}">
+        <p14:creationId xmlns:p14="http://schemas.microsoft.com/office/powerpoint/2010/main" val="4226525697"/>
+      </p:ext>
+    </p:extLst>
+  </p:cSld>
+  <p:clrMapOvr>
+    <a:masterClrMapping/>
+  </p:clrMapOvr>
+</p:sld>
+</file>
+
+<file path=ppt/slides/slide25.xml><?xml version="1.0" encoding="utf-8"?>
+<p:sld xmlns:a="http://schemas.openxmlformats.org/drawingml/2006/main" xmlns:r="http://schemas.openxmlformats.org/officeDocument/2006/relationships" xmlns:p="http://schemas.openxmlformats.org/presentationml/2006/main">
+  <p:cSld>
+    <p:spTree>
+      <p:nvGrpSpPr>
+        <p:cNvPr id="1" name="Shape 271"/>
+        <p:cNvGrpSpPr/>
+        <p:nvPr/>
+      </p:nvGrpSpPr>
+      <p:grpSpPr>
+        <a:xfrm>
+          <a:off x="0" y="0"/>
+          <a:ext cx="0" cy="0"/>
+          <a:chOff x="0" y="0"/>
+          <a:chExt cx="0" cy="0"/>
+        </a:xfrm>
+      </p:grpSpPr>
+      <p:sp>
+        <p:nvSpPr>
+          <p:cNvPr id="272" name="Google Shape;272;ga479f66027_0_1"/>
+          <p:cNvSpPr txBox="1">
+            <a:spLocks noGrp="1"/>
+          </p:cNvSpPr>
+          <p:nvPr>
+            <p:ph type="title"/>
+          </p:nvPr>
+        </p:nvSpPr>
+        <p:spPr>
+          <a:xfrm>
             <a:off x="1035171" y="821125"/>
             <a:ext cx="10921040" cy="738296"/>
           </a:xfrm>
@@ -16371,7 +18529,7 @@
 </p:sld>
 </file>
 
-<file path=ppt/slides/slide22.xml><?xml version="1.0" encoding="utf-8"?>
+<file path=ppt/slides/slide26.xml><?xml version="1.0" encoding="utf-8"?>
 <p:sld xmlns:a="http://schemas.openxmlformats.org/drawingml/2006/main" xmlns:r="http://schemas.openxmlformats.org/officeDocument/2006/relationships" xmlns:p="http://schemas.openxmlformats.org/presentationml/2006/main">
   <p:cSld>
     <p:spTree>

</xml_diff>